<commit_message>
Continued with Data Collection.
</commit_message>
<xml_diff>
--- a/Figures/Powerpoints/3 plots.pptx
+++ b/Figures/Powerpoints/3 plots.pptx
@@ -5,7 +5,7 @@
     <p:sldMasterId id="2147483672" r:id="rId1"/>
   </p:sldMasterIdLst>
   <p:notesMasterIdLst>
-    <p:notesMasterId r:id="rId10"/>
+    <p:notesMasterId r:id="rId13"/>
   </p:notesMasterIdLst>
   <p:sldIdLst>
     <p:sldId id="256" r:id="rId2"/>
@@ -16,6 +16,9 @@
     <p:sldId id="261" r:id="rId7"/>
     <p:sldId id="262" r:id="rId8"/>
     <p:sldId id="263" r:id="rId9"/>
+    <p:sldId id="265" r:id="rId10"/>
+    <p:sldId id="266" r:id="rId11"/>
+    <p:sldId id="268" r:id="rId12"/>
   </p:sldIdLst>
   <p:sldSz cx="10799763" cy="3959225"/>
   <p:notesSz cx="6858000" cy="9144000"/>
@@ -204,7 +207,7 @@
           <a:p>
             <a:fld id="{32F7D83B-ADDA-4ECB-B692-7302BE334C8B}" type="datetimeFigureOut">
               <a:rPr lang="en-GB" smtClean="0"/>
-              <a:t>30/07/2015</a:t>
+              <a:t>05/08/2015</a:t>
             </a:fld>
             <a:endParaRPr lang="en-GB"/>
           </a:p>
@@ -1010,6 +1013,301 @@
 </p:notes>
 </file>
 
+<file path=ppt/notesSlides/notesSlide7.xml><?xml version="1.0" encoding="utf-8"?>
+<p:notes xmlns:a="http://schemas.openxmlformats.org/drawingml/2006/main" xmlns:r="http://schemas.openxmlformats.org/officeDocument/2006/relationships" xmlns:p="http://schemas.openxmlformats.org/presentationml/2006/main">
+  <p:cSld>
+    <p:spTree>
+      <p:nvGrpSpPr>
+        <p:cNvPr id="1" name=""/>
+        <p:cNvGrpSpPr/>
+        <p:nvPr/>
+      </p:nvGrpSpPr>
+      <p:grpSpPr>
+        <a:xfrm>
+          <a:off x="0" y="0"/>
+          <a:ext cx="0" cy="0"/>
+          <a:chOff x="0" y="0"/>
+          <a:chExt cx="0" cy="0"/>
+        </a:xfrm>
+      </p:grpSpPr>
+      <p:sp>
+        <p:nvSpPr>
+          <p:cNvPr id="2" name="Slide Image Placeholder 1"/>
+          <p:cNvSpPr>
+            <a:spLocks noGrp="1" noRot="1" noChangeAspect="1"/>
+          </p:cNvSpPr>
+          <p:nvPr>
+            <p:ph type="sldImg"/>
+          </p:nvPr>
+        </p:nvSpPr>
+        <p:spPr/>
+      </p:sp>
+      <p:sp>
+        <p:nvSpPr>
+          <p:cNvPr id="3" name="Notes Placeholder 2"/>
+          <p:cNvSpPr>
+            <a:spLocks noGrp="1"/>
+          </p:cNvSpPr>
+          <p:nvPr>
+            <p:ph type="body" idx="1"/>
+          </p:nvPr>
+        </p:nvSpPr>
+        <p:spPr/>
+        <p:txBody>
+          <a:bodyPr/>
+          <a:lstStyle/>
+          <a:p>
+            <a:r>
+              <a:rPr lang="en-GB" dirty="0" smtClean="0"/>
+              <a:t>Thy 1 24.10.14,   Thy 3 </a:t>
+            </a:r>
+            <a:r>
+              <a:rPr lang="en-GB" dirty="0" smtClean="0"/>
+              <a:t>31.10.14, Thy 12 10.7.15</a:t>
+            </a:r>
+          </a:p>
+          <a:p>
+            <a:r>
+              <a:rPr lang="en-GB" dirty="0" smtClean="0"/>
+              <a:t>NOD Pro pre presence</a:t>
+            </a:r>
+            <a:endParaRPr lang="en-GB" dirty="0"/>
+          </a:p>
+        </p:txBody>
+      </p:sp>
+      <p:sp>
+        <p:nvSpPr>
+          <p:cNvPr id="4" name="Slide Number Placeholder 3"/>
+          <p:cNvSpPr>
+            <a:spLocks noGrp="1"/>
+          </p:cNvSpPr>
+          <p:nvPr>
+            <p:ph type="sldNum" sz="quarter" idx="10"/>
+          </p:nvPr>
+        </p:nvSpPr>
+        <p:spPr/>
+        <p:txBody>
+          <a:bodyPr/>
+          <a:lstStyle/>
+          <a:p>
+            <a:fld id="{F9FE1E78-BF79-4B81-BC92-5B601D8D92F9}" type="slidenum">
+              <a:rPr lang="en-GB" smtClean="0"/>
+              <a:t>9</a:t>
+            </a:fld>
+            <a:endParaRPr lang="en-GB"/>
+          </a:p>
+        </p:txBody>
+      </p:sp>
+    </p:spTree>
+    <p:extLst>
+      <p:ext uri="{BB962C8B-B14F-4D97-AF65-F5344CB8AC3E}">
+        <p14:creationId xmlns:p14="http://schemas.microsoft.com/office/powerpoint/2010/main" val="2674970101"/>
+      </p:ext>
+    </p:extLst>
+  </p:cSld>
+  <p:clrMapOvr>
+    <a:masterClrMapping/>
+  </p:clrMapOvr>
+</p:notes>
+</file>
+
+<file path=ppt/notesSlides/notesSlide8.xml><?xml version="1.0" encoding="utf-8"?>
+<p:notes xmlns:a="http://schemas.openxmlformats.org/drawingml/2006/main" xmlns:r="http://schemas.openxmlformats.org/officeDocument/2006/relationships" xmlns:p="http://schemas.openxmlformats.org/presentationml/2006/main">
+  <p:cSld>
+    <p:spTree>
+      <p:nvGrpSpPr>
+        <p:cNvPr id="1" name=""/>
+        <p:cNvGrpSpPr/>
+        <p:nvPr/>
+      </p:nvGrpSpPr>
+      <p:grpSpPr>
+        <a:xfrm>
+          <a:off x="0" y="0"/>
+          <a:ext cx="0" cy="0"/>
+          <a:chOff x="0" y="0"/>
+          <a:chExt cx="0" cy="0"/>
+        </a:xfrm>
+      </p:grpSpPr>
+      <p:sp>
+        <p:nvSpPr>
+          <p:cNvPr id="2" name="Slide Image Placeholder 1"/>
+          <p:cNvSpPr>
+            <a:spLocks noGrp="1" noRot="1" noChangeAspect="1"/>
+          </p:cNvSpPr>
+          <p:nvPr>
+            <p:ph type="sldImg"/>
+          </p:nvPr>
+        </p:nvSpPr>
+        <p:spPr/>
+      </p:sp>
+      <p:sp>
+        <p:nvSpPr>
+          <p:cNvPr id="3" name="Notes Placeholder 2"/>
+          <p:cNvSpPr>
+            <a:spLocks noGrp="1"/>
+          </p:cNvSpPr>
+          <p:nvPr>
+            <p:ph type="body" idx="1"/>
+          </p:nvPr>
+        </p:nvSpPr>
+        <p:spPr/>
+        <p:txBody>
+          <a:bodyPr/>
+          <a:lstStyle/>
+          <a:p>
+            <a:r>
+              <a:rPr lang="en-GB" dirty="0" smtClean="0"/>
+              <a:t>Thy 1 24.10.14, Thy</a:t>
+            </a:r>
+            <a:r>
+              <a:rPr lang="en-GB" baseline="0" dirty="0" smtClean="0"/>
+              <a:t> 1 31.10.14</a:t>
+            </a:r>
+            <a:r>
+              <a:rPr lang="en-GB" dirty="0" smtClean="0"/>
+              <a:t> &amp; Thy</a:t>
+            </a:r>
+            <a:r>
+              <a:rPr lang="en-GB" baseline="0" dirty="0" smtClean="0"/>
+              <a:t> 5 24.11.14</a:t>
+            </a:r>
+            <a:endParaRPr lang="en-GB" dirty="0" smtClean="0"/>
+          </a:p>
+          <a:p>
+            <a:endParaRPr lang="en-GB" dirty="0"/>
+          </a:p>
+        </p:txBody>
+      </p:sp>
+      <p:sp>
+        <p:nvSpPr>
+          <p:cNvPr id="4" name="Slide Number Placeholder 3"/>
+          <p:cNvSpPr>
+            <a:spLocks noGrp="1"/>
+          </p:cNvSpPr>
+          <p:nvPr>
+            <p:ph type="sldNum" sz="quarter" idx="10"/>
+          </p:nvPr>
+        </p:nvSpPr>
+        <p:spPr/>
+        <p:txBody>
+          <a:bodyPr/>
+          <a:lstStyle/>
+          <a:p>
+            <a:fld id="{F9FE1E78-BF79-4B81-BC92-5B601D8D92F9}" type="slidenum">
+              <a:rPr lang="en-GB" smtClean="0"/>
+              <a:t>10</a:t>
+            </a:fld>
+            <a:endParaRPr lang="en-GB"/>
+          </a:p>
+        </p:txBody>
+      </p:sp>
+    </p:spTree>
+    <p:extLst>
+      <p:ext uri="{BB962C8B-B14F-4D97-AF65-F5344CB8AC3E}">
+        <p14:creationId xmlns:p14="http://schemas.microsoft.com/office/powerpoint/2010/main" val="2783587525"/>
+      </p:ext>
+    </p:extLst>
+  </p:cSld>
+  <p:clrMapOvr>
+    <a:masterClrMapping/>
+  </p:clrMapOvr>
+</p:notes>
+</file>
+
+<file path=ppt/notesSlides/notesSlide9.xml><?xml version="1.0" encoding="utf-8"?>
+<p:notes xmlns:a="http://schemas.openxmlformats.org/drawingml/2006/main" xmlns:r="http://schemas.openxmlformats.org/officeDocument/2006/relationships" xmlns:p="http://schemas.openxmlformats.org/presentationml/2006/main">
+  <p:cSld>
+    <p:spTree>
+      <p:nvGrpSpPr>
+        <p:cNvPr id="1" name=""/>
+        <p:cNvGrpSpPr/>
+        <p:nvPr/>
+      </p:nvGrpSpPr>
+      <p:grpSpPr>
+        <a:xfrm>
+          <a:off x="0" y="0"/>
+          <a:ext cx="0" cy="0"/>
+          <a:chOff x="0" y="0"/>
+          <a:chExt cx="0" cy="0"/>
+        </a:xfrm>
+      </p:grpSpPr>
+      <p:sp>
+        <p:nvSpPr>
+          <p:cNvPr id="2" name="Slide Image Placeholder 1"/>
+          <p:cNvSpPr>
+            <a:spLocks noGrp="1" noRot="1" noChangeAspect="1"/>
+          </p:cNvSpPr>
+          <p:nvPr>
+            <p:ph type="sldImg"/>
+          </p:nvPr>
+        </p:nvSpPr>
+        <p:spPr/>
+      </p:sp>
+      <p:sp>
+        <p:nvSpPr>
+          <p:cNvPr id="3" name="Notes Placeholder 2"/>
+          <p:cNvSpPr>
+            <a:spLocks noGrp="1"/>
+          </p:cNvSpPr>
+          <p:nvPr>
+            <p:ph type="body" idx="1"/>
+          </p:nvPr>
+        </p:nvSpPr>
+        <p:spPr/>
+        <p:txBody>
+          <a:bodyPr/>
+          <a:lstStyle/>
+          <a:p>
+            <a:r>
+              <a:rPr lang="en-GB" dirty="0" smtClean="0"/>
+              <a:t>Thy 1 24.10.14, Thy 1 31.10.14, Thy 5 24.11.14</a:t>
+            </a:r>
+          </a:p>
+          <a:p>
+            <a:r>
+              <a:rPr lang="en-GB" dirty="0" smtClean="0"/>
+              <a:t>Total thymus</a:t>
+            </a:r>
+            <a:endParaRPr lang="en-GB" dirty="0"/>
+          </a:p>
+        </p:txBody>
+      </p:sp>
+      <p:sp>
+        <p:nvSpPr>
+          <p:cNvPr id="4" name="Slide Number Placeholder 3"/>
+          <p:cNvSpPr>
+            <a:spLocks noGrp="1"/>
+          </p:cNvSpPr>
+          <p:nvPr>
+            <p:ph type="sldNum" sz="quarter" idx="10"/>
+          </p:nvPr>
+        </p:nvSpPr>
+        <p:spPr/>
+        <p:txBody>
+          <a:bodyPr/>
+          <a:lstStyle/>
+          <a:p>
+            <a:fld id="{F9FE1E78-BF79-4B81-BC92-5B601D8D92F9}" type="slidenum">
+              <a:rPr lang="en-GB" smtClean="0"/>
+              <a:t>11</a:t>
+            </a:fld>
+            <a:endParaRPr lang="en-GB"/>
+          </a:p>
+        </p:txBody>
+      </p:sp>
+    </p:spTree>
+    <p:extLst>
+      <p:ext uri="{BB962C8B-B14F-4D97-AF65-F5344CB8AC3E}">
+        <p14:creationId xmlns:p14="http://schemas.microsoft.com/office/powerpoint/2010/main" val="3817339002"/>
+      </p:ext>
+    </p:extLst>
+  </p:cSld>
+  <p:clrMapOvr>
+    <a:masterClrMapping/>
+  </p:clrMapOvr>
+</p:notes>
+</file>
+
 <file path=ppt/slideLayouts/slideLayout1.xml><?xml version="1.0" encoding="utf-8"?>
 <p:sldLayout xmlns:a="http://schemas.openxmlformats.org/drawingml/2006/main" xmlns:r="http://schemas.openxmlformats.org/officeDocument/2006/relationships" xmlns:p="http://schemas.openxmlformats.org/presentationml/2006/main" type="title" preserve="1">
   <p:cSld name="Title Slide">
@@ -1141,7 +1439,7 @@
           <a:p>
             <a:fld id="{5FFCCEB8-80C3-44AA-83D7-DF78E6311A10}" type="datetimeFigureOut">
               <a:rPr lang="en-GB" smtClean="0"/>
-              <a:t>30/07/2015</a:t>
+              <a:t>05/08/2015</a:t>
             </a:fld>
             <a:endParaRPr lang="en-GB"/>
           </a:p>
@@ -1311,7 +1609,7 @@
           <a:p>
             <a:fld id="{5FFCCEB8-80C3-44AA-83D7-DF78E6311A10}" type="datetimeFigureOut">
               <a:rPr lang="en-GB" smtClean="0"/>
-              <a:t>30/07/2015</a:t>
+              <a:t>05/08/2015</a:t>
             </a:fld>
             <a:endParaRPr lang="en-GB"/>
           </a:p>
@@ -1491,7 +1789,7 @@
           <a:p>
             <a:fld id="{5FFCCEB8-80C3-44AA-83D7-DF78E6311A10}" type="datetimeFigureOut">
               <a:rPr lang="en-GB" smtClean="0"/>
-              <a:t>30/07/2015</a:t>
+              <a:t>05/08/2015</a:t>
             </a:fld>
             <a:endParaRPr lang="en-GB"/>
           </a:p>
@@ -1661,7 +1959,7 @@
           <a:p>
             <a:fld id="{5FFCCEB8-80C3-44AA-83D7-DF78E6311A10}" type="datetimeFigureOut">
               <a:rPr lang="en-GB" smtClean="0"/>
-              <a:t>30/07/2015</a:t>
+              <a:t>05/08/2015</a:t>
             </a:fld>
             <a:endParaRPr lang="en-GB"/>
           </a:p>
@@ -1907,7 +2205,7 @@
           <a:p>
             <a:fld id="{5FFCCEB8-80C3-44AA-83D7-DF78E6311A10}" type="datetimeFigureOut">
               <a:rPr lang="en-GB" smtClean="0"/>
-              <a:t>30/07/2015</a:t>
+              <a:t>05/08/2015</a:t>
             </a:fld>
             <a:endParaRPr lang="en-GB"/>
           </a:p>
@@ -2139,7 +2437,7 @@
           <a:p>
             <a:fld id="{5FFCCEB8-80C3-44AA-83D7-DF78E6311A10}" type="datetimeFigureOut">
               <a:rPr lang="en-GB" smtClean="0"/>
-              <a:t>30/07/2015</a:t>
+              <a:t>05/08/2015</a:t>
             </a:fld>
             <a:endParaRPr lang="en-GB"/>
           </a:p>
@@ -2506,7 +2804,7 @@
           <a:p>
             <a:fld id="{5FFCCEB8-80C3-44AA-83D7-DF78E6311A10}" type="datetimeFigureOut">
               <a:rPr lang="en-GB" smtClean="0"/>
-              <a:t>30/07/2015</a:t>
+              <a:t>05/08/2015</a:t>
             </a:fld>
             <a:endParaRPr lang="en-GB"/>
           </a:p>
@@ -2624,7 +2922,7 @@
           <a:p>
             <a:fld id="{5FFCCEB8-80C3-44AA-83D7-DF78E6311A10}" type="datetimeFigureOut">
               <a:rPr lang="en-GB" smtClean="0"/>
-              <a:t>30/07/2015</a:t>
+              <a:t>05/08/2015</a:t>
             </a:fld>
             <a:endParaRPr lang="en-GB"/>
           </a:p>
@@ -2719,7 +3017,7 @@
           <a:p>
             <a:fld id="{5FFCCEB8-80C3-44AA-83D7-DF78E6311A10}" type="datetimeFigureOut">
               <a:rPr lang="en-GB" smtClean="0"/>
-              <a:t>30/07/2015</a:t>
+              <a:t>05/08/2015</a:t>
             </a:fld>
             <a:endParaRPr lang="en-GB"/>
           </a:p>
@@ -2996,7 +3294,7 @@
           <a:p>
             <a:fld id="{5FFCCEB8-80C3-44AA-83D7-DF78E6311A10}" type="datetimeFigureOut">
               <a:rPr lang="en-GB" smtClean="0"/>
-              <a:t>30/07/2015</a:t>
+              <a:t>05/08/2015</a:t>
             </a:fld>
             <a:endParaRPr lang="en-GB"/>
           </a:p>
@@ -3253,7 +3551,7 @@
           <a:p>
             <a:fld id="{5FFCCEB8-80C3-44AA-83D7-DF78E6311A10}" type="datetimeFigureOut">
               <a:rPr lang="en-GB" smtClean="0"/>
-              <a:t>30/07/2015</a:t>
+              <a:t>05/08/2015</a:t>
             </a:fld>
             <a:endParaRPr lang="en-GB"/>
           </a:p>
@@ -3466,7 +3764,7 @@
           <a:p>
             <a:fld id="{5FFCCEB8-80C3-44AA-83D7-DF78E6311A10}" type="datetimeFigureOut">
               <a:rPr lang="en-GB" smtClean="0"/>
-              <a:t>30/07/2015</a:t>
+              <a:t>05/08/2015</a:t>
             </a:fld>
             <a:endParaRPr lang="en-GB"/>
           </a:p>
@@ -3913,6 +4211,1562 @@
     <p:extLst>
       <p:ext uri="{BB962C8B-B14F-4D97-AF65-F5344CB8AC3E}">
         <p14:creationId xmlns:p14="http://schemas.microsoft.com/office/powerpoint/2010/main" val="1144489369"/>
+      </p:ext>
+    </p:extLst>
+  </p:cSld>
+  <p:clrMapOvr>
+    <a:masterClrMapping/>
+  </p:clrMapOvr>
+</p:sld>
+</file>
+
+<file path=ppt/slides/slide10.xml><?xml version="1.0" encoding="utf-8"?>
+<p:sld xmlns:a="http://schemas.openxmlformats.org/drawingml/2006/main" xmlns:r="http://schemas.openxmlformats.org/officeDocument/2006/relationships" xmlns:p="http://schemas.openxmlformats.org/presentationml/2006/main">
+  <p:cSld>
+    <p:spTree>
+      <p:nvGrpSpPr>
+        <p:cNvPr id="1" name=""/>
+        <p:cNvGrpSpPr/>
+        <p:nvPr/>
+      </p:nvGrpSpPr>
+      <p:grpSpPr>
+        <a:xfrm>
+          <a:off x="0" y="0"/>
+          <a:ext cx="0" cy="0"/>
+          <a:chOff x="0" y="0"/>
+          <a:chExt cx="0" cy="0"/>
+        </a:xfrm>
+      </p:grpSpPr>
+      <p:pic>
+        <p:nvPicPr>
+          <p:cNvPr id="28" name="Picture 27"/>
+          <p:cNvPicPr>
+            <a:picLocks noChangeAspect="1"/>
+          </p:cNvPicPr>
+          <p:nvPr/>
+        </p:nvPicPr>
+        <p:blipFill>
+          <a:blip r:embed="rId3"/>
+          <a:stretch>
+            <a:fillRect/>
+          </a:stretch>
+        </p:blipFill>
+        <p:spPr>
+          <a:xfrm>
+            <a:off x="3574004" y="260091"/>
+            <a:ext cx="3505200" cy="3638550"/>
+          </a:xfrm>
+          <a:prstGeom prst="rect">
+            <a:avLst/>
+          </a:prstGeom>
+        </p:spPr>
+      </p:pic>
+      <p:pic>
+        <p:nvPicPr>
+          <p:cNvPr id="27" name="Picture 26"/>
+          <p:cNvPicPr>
+            <a:picLocks noChangeAspect="1"/>
+          </p:cNvPicPr>
+          <p:nvPr/>
+        </p:nvPicPr>
+        <p:blipFill>
+          <a:blip r:embed="rId4"/>
+          <a:stretch>
+            <a:fillRect/>
+          </a:stretch>
+        </p:blipFill>
+        <p:spPr>
+          <a:xfrm>
+            <a:off x="103901" y="260091"/>
+            <a:ext cx="3505200" cy="3638550"/>
+          </a:xfrm>
+          <a:prstGeom prst="rect">
+            <a:avLst/>
+          </a:prstGeom>
+        </p:spPr>
+      </p:pic>
+      <p:pic>
+        <p:nvPicPr>
+          <p:cNvPr id="26" name="Picture 25"/>
+          <p:cNvPicPr>
+            <a:picLocks noChangeAspect="1"/>
+          </p:cNvPicPr>
+          <p:nvPr/>
+        </p:nvPicPr>
+        <p:blipFill>
+          <a:blip r:embed="rId5"/>
+          <a:stretch>
+            <a:fillRect/>
+          </a:stretch>
+        </p:blipFill>
+        <p:spPr>
+          <a:xfrm>
+            <a:off x="7112456" y="260091"/>
+            <a:ext cx="3505200" cy="3638550"/>
+          </a:xfrm>
+          <a:prstGeom prst="rect">
+            <a:avLst/>
+          </a:prstGeom>
+        </p:spPr>
+      </p:pic>
+      <p:sp>
+        <p:nvSpPr>
+          <p:cNvPr id="3" name="TextBox 2"/>
+          <p:cNvSpPr txBox="1"/>
+          <p:nvPr/>
+        </p:nvSpPr>
+        <p:spPr>
+          <a:xfrm>
+            <a:off x="955963" y="798020"/>
+            <a:ext cx="758541" cy="646331"/>
+          </a:xfrm>
+          <a:prstGeom prst="rect">
+            <a:avLst/>
+          </a:prstGeom>
+          <a:solidFill>
+            <a:schemeClr val="bg1"/>
+          </a:solidFill>
+        </p:spPr>
+        <p:txBody>
+          <a:bodyPr wrap="none" rtlCol="0">
+            <a:spAutoFit/>
+          </a:bodyPr>
+          <a:lstStyle/>
+          <a:p>
+            <a:pPr algn="ctr"/>
+            <a:r>
+              <a:rPr lang="en-GB" dirty="0" smtClean="0"/>
+              <a:t>RAG-</a:t>
+            </a:r>
+          </a:p>
+          <a:p>
+            <a:pPr algn="ctr"/>
+            <a:r>
+              <a:rPr lang="en-GB" dirty="0" smtClean="0"/>
+              <a:t>59.4%</a:t>
+            </a:r>
+            <a:endParaRPr lang="en-GB" dirty="0"/>
+          </a:p>
+        </p:txBody>
+      </p:sp>
+      <p:sp>
+        <p:nvSpPr>
+          <p:cNvPr id="4" name="TextBox 3"/>
+          <p:cNvSpPr txBox="1"/>
+          <p:nvPr/>
+        </p:nvSpPr>
+        <p:spPr>
+          <a:xfrm>
+            <a:off x="1625465" y="798019"/>
+            <a:ext cx="814005" cy="646331"/>
+          </a:xfrm>
+          <a:prstGeom prst="rect">
+            <a:avLst/>
+          </a:prstGeom>
+          <a:solidFill>
+            <a:schemeClr val="bg1"/>
+          </a:solidFill>
+        </p:spPr>
+        <p:txBody>
+          <a:bodyPr wrap="none" rtlCol="0">
+            <a:spAutoFit/>
+          </a:bodyPr>
+          <a:lstStyle/>
+          <a:p>
+            <a:pPr algn="ctr"/>
+            <a:r>
+              <a:rPr lang="en-GB" dirty="0" err="1" smtClean="0"/>
+              <a:t>RAG</a:t>
+            </a:r>
+            <a:r>
+              <a:rPr lang="en-GB" baseline="30000" dirty="0" err="1" smtClean="0"/>
+              <a:t>low</a:t>
+            </a:r>
+            <a:endParaRPr lang="en-GB" baseline="30000" dirty="0" smtClean="0"/>
+          </a:p>
+          <a:p>
+            <a:pPr algn="ctr"/>
+            <a:r>
+              <a:rPr lang="en-GB" dirty="0" smtClean="0"/>
+              <a:t>32.3%</a:t>
+            </a:r>
+            <a:endParaRPr lang="en-GB" dirty="0"/>
+          </a:p>
+        </p:txBody>
+      </p:sp>
+      <p:sp>
+        <p:nvSpPr>
+          <p:cNvPr id="5" name="TextBox 4"/>
+          <p:cNvSpPr txBox="1"/>
+          <p:nvPr/>
+        </p:nvSpPr>
+        <p:spPr>
+          <a:xfrm>
+            <a:off x="2348027" y="798018"/>
+            <a:ext cx="854658" cy="646331"/>
+          </a:xfrm>
+          <a:prstGeom prst="rect">
+            <a:avLst/>
+          </a:prstGeom>
+          <a:solidFill>
+            <a:schemeClr val="bg1"/>
+          </a:solidFill>
+        </p:spPr>
+        <p:txBody>
+          <a:bodyPr wrap="none" rtlCol="0">
+            <a:spAutoFit/>
+          </a:bodyPr>
+          <a:lstStyle/>
+          <a:p>
+            <a:pPr algn="ctr"/>
+            <a:r>
+              <a:rPr lang="en-GB" dirty="0" err="1" smtClean="0"/>
+              <a:t>RAG</a:t>
+            </a:r>
+            <a:r>
+              <a:rPr lang="en-GB" baseline="30000" dirty="0" err="1" smtClean="0"/>
+              <a:t>high</a:t>
+            </a:r>
+            <a:endParaRPr lang="en-GB" baseline="30000" dirty="0" smtClean="0"/>
+          </a:p>
+          <a:p>
+            <a:pPr algn="ctr"/>
+            <a:r>
+              <a:rPr lang="en-GB" dirty="0" smtClean="0"/>
+              <a:t>3.49%</a:t>
+            </a:r>
+            <a:endParaRPr lang="en-GB" dirty="0"/>
+          </a:p>
+        </p:txBody>
+      </p:sp>
+      <p:sp>
+        <p:nvSpPr>
+          <p:cNvPr id="7" name="TextBox 6"/>
+          <p:cNvSpPr txBox="1"/>
+          <p:nvPr/>
+        </p:nvSpPr>
+        <p:spPr>
+          <a:xfrm>
+            <a:off x="4433787" y="809105"/>
+            <a:ext cx="758541" cy="646331"/>
+          </a:xfrm>
+          <a:prstGeom prst="rect">
+            <a:avLst/>
+          </a:prstGeom>
+          <a:solidFill>
+            <a:schemeClr val="bg1"/>
+          </a:solidFill>
+        </p:spPr>
+        <p:txBody>
+          <a:bodyPr wrap="none" rtlCol="0">
+            <a:spAutoFit/>
+          </a:bodyPr>
+          <a:lstStyle/>
+          <a:p>
+            <a:pPr algn="ctr"/>
+            <a:r>
+              <a:rPr lang="en-GB" dirty="0" smtClean="0"/>
+              <a:t>RAG-</a:t>
+            </a:r>
+          </a:p>
+          <a:p>
+            <a:pPr algn="ctr"/>
+            <a:r>
+              <a:rPr lang="en-GB" dirty="0" smtClean="0"/>
+              <a:t>76.2%</a:t>
+            </a:r>
+            <a:endParaRPr lang="en-GB" dirty="0"/>
+          </a:p>
+        </p:txBody>
+      </p:sp>
+      <p:sp>
+        <p:nvSpPr>
+          <p:cNvPr id="8" name="TextBox 7"/>
+          <p:cNvSpPr txBox="1"/>
+          <p:nvPr/>
+        </p:nvSpPr>
+        <p:spPr>
+          <a:xfrm>
+            <a:off x="5152832" y="809105"/>
+            <a:ext cx="814005" cy="646331"/>
+          </a:xfrm>
+          <a:prstGeom prst="rect">
+            <a:avLst/>
+          </a:prstGeom>
+          <a:solidFill>
+            <a:schemeClr val="bg1"/>
+          </a:solidFill>
+        </p:spPr>
+        <p:txBody>
+          <a:bodyPr wrap="none" rtlCol="0">
+            <a:spAutoFit/>
+          </a:bodyPr>
+          <a:lstStyle/>
+          <a:p>
+            <a:pPr algn="ctr"/>
+            <a:r>
+              <a:rPr lang="en-GB" dirty="0" err="1" smtClean="0"/>
+              <a:t>RAG</a:t>
+            </a:r>
+            <a:r>
+              <a:rPr lang="en-GB" baseline="30000" dirty="0" err="1" smtClean="0"/>
+              <a:t>low</a:t>
+            </a:r>
+            <a:endParaRPr lang="en-GB" baseline="30000" dirty="0" smtClean="0"/>
+          </a:p>
+          <a:p>
+            <a:pPr algn="ctr"/>
+            <a:r>
+              <a:rPr lang="en-GB" dirty="0" smtClean="0"/>
+              <a:t>17.1%</a:t>
+            </a:r>
+            <a:endParaRPr lang="en-GB" dirty="0"/>
+          </a:p>
+        </p:txBody>
+      </p:sp>
+      <p:sp>
+        <p:nvSpPr>
+          <p:cNvPr id="9" name="TextBox 8"/>
+          <p:cNvSpPr txBox="1"/>
+          <p:nvPr/>
+        </p:nvSpPr>
+        <p:spPr>
+          <a:xfrm>
+            <a:off x="5966837" y="809105"/>
+            <a:ext cx="854658" cy="646331"/>
+          </a:xfrm>
+          <a:prstGeom prst="rect">
+            <a:avLst/>
+          </a:prstGeom>
+          <a:solidFill>
+            <a:schemeClr val="bg1"/>
+          </a:solidFill>
+        </p:spPr>
+        <p:txBody>
+          <a:bodyPr wrap="none" rtlCol="0">
+            <a:spAutoFit/>
+          </a:bodyPr>
+          <a:lstStyle/>
+          <a:p>
+            <a:pPr algn="ctr"/>
+            <a:r>
+              <a:rPr lang="en-GB" dirty="0" err="1" smtClean="0"/>
+              <a:t>RAG</a:t>
+            </a:r>
+            <a:r>
+              <a:rPr lang="en-GB" baseline="30000" dirty="0" err="1" smtClean="0"/>
+              <a:t>high</a:t>
+            </a:r>
+            <a:endParaRPr lang="en-GB" baseline="30000" dirty="0" smtClean="0"/>
+          </a:p>
+          <a:p>
+            <a:pPr algn="ctr"/>
+            <a:r>
+              <a:rPr lang="en-GB" dirty="0" smtClean="0"/>
+              <a:t>3.03%</a:t>
+            </a:r>
+            <a:endParaRPr lang="en-GB" dirty="0"/>
+          </a:p>
+        </p:txBody>
+      </p:sp>
+      <p:sp>
+        <p:nvSpPr>
+          <p:cNvPr id="11" name="TextBox 10"/>
+          <p:cNvSpPr txBox="1"/>
+          <p:nvPr/>
+        </p:nvSpPr>
+        <p:spPr>
+          <a:xfrm>
+            <a:off x="7964621" y="809451"/>
+            <a:ext cx="758541" cy="646331"/>
+          </a:xfrm>
+          <a:prstGeom prst="rect">
+            <a:avLst/>
+          </a:prstGeom>
+          <a:solidFill>
+            <a:schemeClr val="bg1"/>
+          </a:solidFill>
+        </p:spPr>
+        <p:txBody>
+          <a:bodyPr wrap="none" rtlCol="0">
+            <a:spAutoFit/>
+          </a:bodyPr>
+          <a:lstStyle/>
+          <a:p>
+            <a:pPr algn="ctr"/>
+            <a:r>
+              <a:rPr lang="en-GB" dirty="0" smtClean="0"/>
+              <a:t>RAG-</a:t>
+            </a:r>
+          </a:p>
+          <a:p>
+            <a:pPr algn="ctr"/>
+            <a:r>
+              <a:rPr lang="en-GB" dirty="0" smtClean="0"/>
+              <a:t>83.4%</a:t>
+            </a:r>
+            <a:endParaRPr lang="en-GB" dirty="0"/>
+          </a:p>
+        </p:txBody>
+      </p:sp>
+      <p:sp>
+        <p:nvSpPr>
+          <p:cNvPr id="12" name="TextBox 11"/>
+          <p:cNvSpPr txBox="1"/>
+          <p:nvPr/>
+        </p:nvSpPr>
+        <p:spPr>
+          <a:xfrm>
+            <a:off x="8683666" y="809451"/>
+            <a:ext cx="814005" cy="646331"/>
+          </a:xfrm>
+          <a:prstGeom prst="rect">
+            <a:avLst/>
+          </a:prstGeom>
+          <a:solidFill>
+            <a:schemeClr val="bg1"/>
+          </a:solidFill>
+        </p:spPr>
+        <p:txBody>
+          <a:bodyPr wrap="none" rtlCol="0">
+            <a:spAutoFit/>
+          </a:bodyPr>
+          <a:lstStyle/>
+          <a:p>
+            <a:pPr algn="ctr"/>
+            <a:r>
+              <a:rPr lang="en-GB" dirty="0" err="1" smtClean="0"/>
+              <a:t>RAG</a:t>
+            </a:r>
+            <a:r>
+              <a:rPr lang="en-GB" baseline="30000" dirty="0" err="1" smtClean="0"/>
+              <a:t>low</a:t>
+            </a:r>
+            <a:endParaRPr lang="en-GB" baseline="30000" dirty="0" smtClean="0"/>
+          </a:p>
+          <a:p>
+            <a:pPr algn="ctr"/>
+            <a:r>
+              <a:rPr lang="en-GB" dirty="0" smtClean="0"/>
+              <a:t>12.4%</a:t>
+            </a:r>
+            <a:endParaRPr lang="en-GB" dirty="0"/>
+          </a:p>
+        </p:txBody>
+      </p:sp>
+      <p:sp>
+        <p:nvSpPr>
+          <p:cNvPr id="13" name="TextBox 12"/>
+          <p:cNvSpPr txBox="1"/>
+          <p:nvPr/>
+        </p:nvSpPr>
+        <p:spPr>
+          <a:xfrm>
+            <a:off x="9487220" y="809451"/>
+            <a:ext cx="875561" cy="646331"/>
+          </a:xfrm>
+          <a:prstGeom prst="rect">
+            <a:avLst/>
+          </a:prstGeom>
+          <a:solidFill>
+            <a:schemeClr val="bg1"/>
+          </a:solidFill>
+        </p:spPr>
+        <p:txBody>
+          <a:bodyPr wrap="none" rtlCol="0">
+            <a:spAutoFit/>
+          </a:bodyPr>
+          <a:lstStyle/>
+          <a:p>
+            <a:pPr algn="ctr"/>
+            <a:r>
+              <a:rPr lang="en-GB" dirty="0" err="1" smtClean="0"/>
+              <a:t>RAG</a:t>
+            </a:r>
+            <a:r>
+              <a:rPr lang="en-GB" baseline="30000" dirty="0" err="1" smtClean="0"/>
+              <a:t>high</a:t>
+            </a:r>
+            <a:endParaRPr lang="en-GB" baseline="30000" dirty="0" smtClean="0"/>
+          </a:p>
+          <a:p>
+            <a:pPr algn="ctr"/>
+            <a:r>
+              <a:rPr lang="en-GB" dirty="0" smtClean="0"/>
+              <a:t>1.17%</a:t>
+            </a:r>
+            <a:endParaRPr lang="en-GB" dirty="0"/>
+          </a:p>
+        </p:txBody>
+      </p:sp>
+      <p:sp>
+        <p:nvSpPr>
+          <p:cNvPr id="14" name="TextBox 13"/>
+          <p:cNvSpPr txBox="1"/>
+          <p:nvPr/>
+        </p:nvSpPr>
+        <p:spPr>
+          <a:xfrm rot="16200000">
+            <a:off x="-457590" y="2059265"/>
+            <a:ext cx="1652697" cy="461665"/>
+          </a:xfrm>
+          <a:prstGeom prst="rect">
+            <a:avLst/>
+          </a:prstGeom>
+          <a:solidFill>
+            <a:schemeClr val="bg1"/>
+          </a:solidFill>
+        </p:spPr>
+        <p:txBody>
+          <a:bodyPr wrap="none" rtlCol="0">
+            <a:spAutoFit/>
+          </a:bodyPr>
+          <a:lstStyle/>
+          <a:p>
+            <a:r>
+              <a:rPr lang="en-GB" sz="2400" dirty="0" smtClean="0"/>
+              <a:t>Side Scatter</a:t>
+            </a:r>
+            <a:endParaRPr lang="en-GB" sz="2400" dirty="0"/>
+          </a:p>
+        </p:txBody>
+      </p:sp>
+      <p:sp>
+        <p:nvSpPr>
+          <p:cNvPr id="15" name="TextBox 14"/>
+          <p:cNvSpPr txBox="1"/>
+          <p:nvPr/>
+        </p:nvSpPr>
+        <p:spPr>
+          <a:xfrm rot="16200000">
+            <a:off x="3042294" y="2059265"/>
+            <a:ext cx="1652697" cy="461665"/>
+          </a:xfrm>
+          <a:prstGeom prst="rect">
+            <a:avLst/>
+          </a:prstGeom>
+          <a:solidFill>
+            <a:schemeClr val="bg1"/>
+          </a:solidFill>
+        </p:spPr>
+        <p:txBody>
+          <a:bodyPr wrap="none" rtlCol="0">
+            <a:spAutoFit/>
+          </a:bodyPr>
+          <a:lstStyle/>
+          <a:p>
+            <a:r>
+              <a:rPr lang="en-GB" sz="2400" dirty="0" smtClean="0"/>
+              <a:t>Side Scatter</a:t>
+            </a:r>
+            <a:endParaRPr lang="en-GB" sz="2400" dirty="0"/>
+          </a:p>
+        </p:txBody>
+      </p:sp>
+      <p:sp>
+        <p:nvSpPr>
+          <p:cNvPr id="16" name="TextBox 15"/>
+          <p:cNvSpPr txBox="1"/>
+          <p:nvPr/>
+        </p:nvSpPr>
+        <p:spPr>
+          <a:xfrm rot="16200000">
+            <a:off x="6526869" y="2059265"/>
+            <a:ext cx="1652697" cy="461665"/>
+          </a:xfrm>
+          <a:prstGeom prst="rect">
+            <a:avLst/>
+          </a:prstGeom>
+          <a:solidFill>
+            <a:schemeClr val="bg1"/>
+          </a:solidFill>
+        </p:spPr>
+        <p:txBody>
+          <a:bodyPr wrap="none" rtlCol="0">
+            <a:spAutoFit/>
+          </a:bodyPr>
+          <a:lstStyle/>
+          <a:p>
+            <a:r>
+              <a:rPr lang="en-GB" sz="2400" dirty="0" smtClean="0"/>
+              <a:t>Side Scatter</a:t>
+            </a:r>
+            <a:endParaRPr lang="en-GB" sz="2400" dirty="0"/>
+          </a:p>
+        </p:txBody>
+      </p:sp>
+      <p:sp>
+        <p:nvSpPr>
+          <p:cNvPr id="17" name="TextBox 16"/>
+          <p:cNvSpPr txBox="1"/>
+          <p:nvPr/>
+        </p:nvSpPr>
+        <p:spPr>
+          <a:xfrm>
+            <a:off x="931022" y="3341719"/>
+            <a:ext cx="2402382" cy="461665"/>
+          </a:xfrm>
+          <a:prstGeom prst="rect">
+            <a:avLst/>
+          </a:prstGeom>
+          <a:solidFill>
+            <a:schemeClr val="bg1"/>
+          </a:solidFill>
+        </p:spPr>
+        <p:txBody>
+          <a:bodyPr wrap="square" rtlCol="0">
+            <a:spAutoFit/>
+          </a:bodyPr>
+          <a:lstStyle/>
+          <a:p>
+            <a:r>
+              <a:rPr lang="en-GB" sz="2400" dirty="0" smtClean="0"/>
+              <a:t>RAG</a:t>
+            </a:r>
+            <a:endParaRPr lang="en-GB" sz="2400" dirty="0"/>
+          </a:p>
+        </p:txBody>
+      </p:sp>
+      <p:sp>
+        <p:nvSpPr>
+          <p:cNvPr id="18" name="TextBox 17"/>
+          <p:cNvSpPr txBox="1"/>
+          <p:nvPr/>
+        </p:nvSpPr>
+        <p:spPr>
+          <a:xfrm>
+            <a:off x="4444535" y="3341719"/>
+            <a:ext cx="2189020" cy="461665"/>
+          </a:xfrm>
+          <a:prstGeom prst="rect">
+            <a:avLst/>
+          </a:prstGeom>
+          <a:solidFill>
+            <a:schemeClr val="bg1"/>
+          </a:solidFill>
+        </p:spPr>
+        <p:txBody>
+          <a:bodyPr wrap="square" rtlCol="0">
+            <a:spAutoFit/>
+          </a:bodyPr>
+          <a:lstStyle/>
+          <a:p>
+            <a:r>
+              <a:rPr lang="en-GB" sz="2400" dirty="0" smtClean="0"/>
+              <a:t>RAG</a:t>
+            </a:r>
+            <a:endParaRPr lang="en-GB" sz="2400" dirty="0"/>
+          </a:p>
+        </p:txBody>
+      </p:sp>
+      <p:sp>
+        <p:nvSpPr>
+          <p:cNvPr id="19" name="TextBox 18"/>
+          <p:cNvSpPr txBox="1"/>
+          <p:nvPr/>
+        </p:nvSpPr>
+        <p:spPr>
+          <a:xfrm>
+            <a:off x="7924796" y="3346187"/>
+            <a:ext cx="1965431" cy="461665"/>
+          </a:xfrm>
+          <a:prstGeom prst="rect">
+            <a:avLst/>
+          </a:prstGeom>
+          <a:solidFill>
+            <a:schemeClr val="bg1"/>
+          </a:solidFill>
+        </p:spPr>
+        <p:txBody>
+          <a:bodyPr wrap="square" rtlCol="0">
+            <a:spAutoFit/>
+          </a:bodyPr>
+          <a:lstStyle/>
+          <a:p>
+            <a:r>
+              <a:rPr lang="en-GB" sz="2400" dirty="0" smtClean="0"/>
+              <a:t>RAG</a:t>
+            </a:r>
+            <a:endParaRPr lang="en-GB" sz="2400" dirty="0"/>
+          </a:p>
+        </p:txBody>
+      </p:sp>
+      <p:sp>
+        <p:nvSpPr>
+          <p:cNvPr id="20" name="TextBox 19"/>
+          <p:cNvSpPr txBox="1"/>
+          <p:nvPr/>
+        </p:nvSpPr>
+        <p:spPr>
+          <a:xfrm>
+            <a:off x="1380182" y="99753"/>
+            <a:ext cx="940322" cy="369332"/>
+          </a:xfrm>
+          <a:prstGeom prst="rect">
+            <a:avLst/>
+          </a:prstGeom>
+          <a:noFill/>
+        </p:spPr>
+        <p:txBody>
+          <a:bodyPr wrap="none" rtlCol="0">
+            <a:spAutoFit/>
+          </a:bodyPr>
+          <a:lstStyle/>
+          <a:p>
+            <a:r>
+              <a:rPr lang="en-GB" dirty="0" smtClean="0"/>
+              <a:t>4 weeks</a:t>
+            </a:r>
+            <a:endParaRPr lang="en-GB" dirty="0"/>
+          </a:p>
+        </p:txBody>
+      </p:sp>
+      <p:sp>
+        <p:nvSpPr>
+          <p:cNvPr id="21" name="TextBox 20"/>
+          <p:cNvSpPr txBox="1"/>
+          <p:nvPr/>
+        </p:nvSpPr>
+        <p:spPr>
+          <a:xfrm>
+            <a:off x="5068884" y="99753"/>
+            <a:ext cx="940322" cy="369332"/>
+          </a:xfrm>
+          <a:prstGeom prst="rect">
+            <a:avLst/>
+          </a:prstGeom>
+          <a:noFill/>
+        </p:spPr>
+        <p:txBody>
+          <a:bodyPr wrap="none" rtlCol="0">
+            <a:spAutoFit/>
+          </a:bodyPr>
+          <a:lstStyle/>
+          <a:p>
+            <a:r>
+              <a:rPr lang="en-GB" dirty="0"/>
+              <a:t>7</a:t>
+            </a:r>
+            <a:r>
+              <a:rPr lang="en-GB" dirty="0" smtClean="0"/>
+              <a:t> weeks</a:t>
+            </a:r>
+            <a:endParaRPr lang="en-GB" dirty="0"/>
+          </a:p>
+        </p:txBody>
+      </p:sp>
+      <p:sp>
+        <p:nvSpPr>
+          <p:cNvPr id="22" name="TextBox 21"/>
+          <p:cNvSpPr txBox="1"/>
+          <p:nvPr/>
+        </p:nvSpPr>
+        <p:spPr>
+          <a:xfrm>
+            <a:off x="8520432" y="99753"/>
+            <a:ext cx="1057341" cy="369332"/>
+          </a:xfrm>
+          <a:prstGeom prst="rect">
+            <a:avLst/>
+          </a:prstGeom>
+          <a:noFill/>
+        </p:spPr>
+        <p:txBody>
+          <a:bodyPr wrap="none" rtlCol="0">
+            <a:spAutoFit/>
+          </a:bodyPr>
+          <a:lstStyle/>
+          <a:p>
+            <a:r>
+              <a:rPr lang="en-GB" dirty="0" smtClean="0"/>
+              <a:t>11 weeks</a:t>
+            </a:r>
+            <a:endParaRPr lang="en-GB" dirty="0"/>
+          </a:p>
+        </p:txBody>
+      </p:sp>
+    </p:spTree>
+    <p:extLst>
+      <p:ext uri="{BB962C8B-B14F-4D97-AF65-F5344CB8AC3E}">
+        <p14:creationId xmlns:p14="http://schemas.microsoft.com/office/powerpoint/2010/main" val="3986142516"/>
+      </p:ext>
+    </p:extLst>
+  </p:cSld>
+  <p:clrMapOvr>
+    <a:masterClrMapping/>
+  </p:clrMapOvr>
+</p:sld>
+</file>
+
+<file path=ppt/slides/slide11.xml><?xml version="1.0" encoding="utf-8"?>
+<p:sld xmlns:a="http://schemas.openxmlformats.org/drawingml/2006/main" xmlns:r="http://schemas.openxmlformats.org/officeDocument/2006/relationships" xmlns:p="http://schemas.openxmlformats.org/presentationml/2006/main">
+  <p:cSld>
+    <p:spTree>
+      <p:nvGrpSpPr>
+        <p:cNvPr id="1" name=""/>
+        <p:cNvGrpSpPr/>
+        <p:nvPr/>
+      </p:nvGrpSpPr>
+      <p:grpSpPr>
+        <a:xfrm>
+          <a:off x="0" y="0"/>
+          <a:ext cx="0" cy="0"/>
+          <a:chOff x="0" y="0"/>
+          <a:chExt cx="0" cy="0"/>
+        </a:xfrm>
+      </p:grpSpPr>
+      <p:pic>
+        <p:nvPicPr>
+          <p:cNvPr id="28" name="Picture 27"/>
+          <p:cNvPicPr>
+            <a:picLocks noChangeAspect="1"/>
+          </p:cNvPicPr>
+          <p:nvPr/>
+        </p:nvPicPr>
+        <p:blipFill>
+          <a:blip r:embed="rId3"/>
+          <a:stretch>
+            <a:fillRect/>
+          </a:stretch>
+        </p:blipFill>
+        <p:spPr>
+          <a:xfrm>
+            <a:off x="3576812" y="260091"/>
+            <a:ext cx="3505200" cy="3638550"/>
+          </a:xfrm>
+          <a:prstGeom prst="rect">
+            <a:avLst/>
+          </a:prstGeom>
+        </p:spPr>
+      </p:pic>
+      <p:pic>
+        <p:nvPicPr>
+          <p:cNvPr id="27" name="Picture 26"/>
+          <p:cNvPicPr>
+            <a:picLocks noChangeAspect="1"/>
+          </p:cNvPicPr>
+          <p:nvPr/>
+        </p:nvPicPr>
+        <p:blipFill>
+          <a:blip r:embed="rId4"/>
+          <a:stretch>
+            <a:fillRect/>
+          </a:stretch>
+        </p:blipFill>
+        <p:spPr>
+          <a:xfrm>
+            <a:off x="97743" y="260091"/>
+            <a:ext cx="3505200" cy="3638550"/>
+          </a:xfrm>
+          <a:prstGeom prst="rect">
+            <a:avLst/>
+          </a:prstGeom>
+        </p:spPr>
+      </p:pic>
+      <p:pic>
+        <p:nvPicPr>
+          <p:cNvPr id="26" name="Picture 25"/>
+          <p:cNvPicPr>
+            <a:picLocks noChangeAspect="1"/>
+          </p:cNvPicPr>
+          <p:nvPr/>
+        </p:nvPicPr>
+        <p:blipFill>
+          <a:blip r:embed="rId5"/>
+          <a:stretch>
+            <a:fillRect/>
+          </a:stretch>
+        </p:blipFill>
+        <p:spPr>
+          <a:xfrm>
+            <a:off x="7122385" y="260091"/>
+            <a:ext cx="3505200" cy="3638550"/>
+          </a:xfrm>
+          <a:prstGeom prst="rect">
+            <a:avLst/>
+          </a:prstGeom>
+        </p:spPr>
+      </p:pic>
+      <p:sp>
+        <p:nvSpPr>
+          <p:cNvPr id="3" name="TextBox 2"/>
+          <p:cNvSpPr txBox="1"/>
+          <p:nvPr/>
+        </p:nvSpPr>
+        <p:spPr>
+          <a:xfrm>
+            <a:off x="955963" y="798020"/>
+            <a:ext cx="758541" cy="646331"/>
+          </a:xfrm>
+          <a:prstGeom prst="rect">
+            <a:avLst/>
+          </a:prstGeom>
+          <a:solidFill>
+            <a:schemeClr val="bg1"/>
+          </a:solidFill>
+        </p:spPr>
+        <p:txBody>
+          <a:bodyPr wrap="none" rtlCol="0">
+            <a:spAutoFit/>
+          </a:bodyPr>
+          <a:lstStyle/>
+          <a:p>
+            <a:pPr algn="ctr"/>
+            <a:r>
+              <a:rPr lang="en-GB" dirty="0" smtClean="0"/>
+              <a:t>RAG-</a:t>
+            </a:r>
+          </a:p>
+          <a:p>
+            <a:pPr algn="ctr"/>
+            <a:r>
+              <a:rPr lang="en-GB" dirty="0" smtClean="0"/>
+              <a:t>44.1%</a:t>
+            </a:r>
+            <a:endParaRPr lang="en-GB" dirty="0"/>
+          </a:p>
+        </p:txBody>
+      </p:sp>
+      <p:sp>
+        <p:nvSpPr>
+          <p:cNvPr id="4" name="TextBox 3"/>
+          <p:cNvSpPr txBox="1"/>
+          <p:nvPr/>
+        </p:nvSpPr>
+        <p:spPr>
+          <a:xfrm>
+            <a:off x="1625465" y="798019"/>
+            <a:ext cx="814005" cy="646331"/>
+          </a:xfrm>
+          <a:prstGeom prst="rect">
+            <a:avLst/>
+          </a:prstGeom>
+          <a:solidFill>
+            <a:schemeClr val="bg1"/>
+          </a:solidFill>
+        </p:spPr>
+        <p:txBody>
+          <a:bodyPr wrap="none" rtlCol="0">
+            <a:spAutoFit/>
+          </a:bodyPr>
+          <a:lstStyle/>
+          <a:p>
+            <a:pPr algn="ctr"/>
+            <a:r>
+              <a:rPr lang="en-GB" dirty="0" err="1" smtClean="0"/>
+              <a:t>RAG</a:t>
+            </a:r>
+            <a:r>
+              <a:rPr lang="en-GB" baseline="30000" dirty="0" err="1" smtClean="0"/>
+              <a:t>low</a:t>
+            </a:r>
+            <a:endParaRPr lang="en-GB" baseline="30000" dirty="0" smtClean="0"/>
+          </a:p>
+          <a:p>
+            <a:pPr algn="ctr"/>
+            <a:r>
+              <a:rPr lang="en-GB" dirty="0" smtClean="0"/>
+              <a:t>17.3%</a:t>
+            </a:r>
+            <a:endParaRPr lang="en-GB" dirty="0"/>
+          </a:p>
+        </p:txBody>
+      </p:sp>
+      <p:sp>
+        <p:nvSpPr>
+          <p:cNvPr id="5" name="TextBox 4"/>
+          <p:cNvSpPr txBox="1"/>
+          <p:nvPr/>
+        </p:nvSpPr>
+        <p:spPr>
+          <a:xfrm>
+            <a:off x="2348027" y="798018"/>
+            <a:ext cx="854658" cy="646331"/>
+          </a:xfrm>
+          <a:prstGeom prst="rect">
+            <a:avLst/>
+          </a:prstGeom>
+          <a:solidFill>
+            <a:schemeClr val="bg1"/>
+          </a:solidFill>
+        </p:spPr>
+        <p:txBody>
+          <a:bodyPr wrap="none" rtlCol="0">
+            <a:spAutoFit/>
+          </a:bodyPr>
+          <a:lstStyle/>
+          <a:p>
+            <a:pPr algn="ctr"/>
+            <a:r>
+              <a:rPr lang="en-GB" dirty="0" err="1" smtClean="0"/>
+              <a:t>RAG</a:t>
+            </a:r>
+            <a:r>
+              <a:rPr lang="en-GB" baseline="30000" dirty="0" err="1" smtClean="0"/>
+              <a:t>high</a:t>
+            </a:r>
+            <a:endParaRPr lang="en-GB" baseline="30000" dirty="0" smtClean="0"/>
+          </a:p>
+          <a:p>
+            <a:pPr algn="ctr"/>
+            <a:r>
+              <a:rPr lang="en-GB" dirty="0" smtClean="0"/>
+              <a:t>34.4%</a:t>
+            </a:r>
+            <a:endParaRPr lang="en-GB" dirty="0"/>
+          </a:p>
+        </p:txBody>
+      </p:sp>
+      <p:sp>
+        <p:nvSpPr>
+          <p:cNvPr id="7" name="TextBox 6"/>
+          <p:cNvSpPr txBox="1"/>
+          <p:nvPr/>
+        </p:nvSpPr>
+        <p:spPr>
+          <a:xfrm>
+            <a:off x="4433787" y="809105"/>
+            <a:ext cx="758541" cy="646331"/>
+          </a:xfrm>
+          <a:prstGeom prst="rect">
+            <a:avLst/>
+          </a:prstGeom>
+          <a:solidFill>
+            <a:schemeClr val="bg1"/>
+          </a:solidFill>
+        </p:spPr>
+        <p:txBody>
+          <a:bodyPr wrap="none" rtlCol="0">
+            <a:spAutoFit/>
+          </a:bodyPr>
+          <a:lstStyle/>
+          <a:p>
+            <a:pPr algn="ctr"/>
+            <a:r>
+              <a:rPr lang="en-GB" dirty="0" smtClean="0"/>
+              <a:t>RAG-</a:t>
+            </a:r>
+          </a:p>
+          <a:p>
+            <a:pPr algn="ctr"/>
+            <a:r>
+              <a:rPr lang="en-GB" dirty="0" smtClean="0"/>
+              <a:t>36.7%</a:t>
+            </a:r>
+            <a:endParaRPr lang="en-GB" dirty="0"/>
+          </a:p>
+        </p:txBody>
+      </p:sp>
+      <p:sp>
+        <p:nvSpPr>
+          <p:cNvPr id="8" name="TextBox 7"/>
+          <p:cNvSpPr txBox="1"/>
+          <p:nvPr/>
+        </p:nvSpPr>
+        <p:spPr>
+          <a:xfrm>
+            <a:off x="5152832" y="809105"/>
+            <a:ext cx="814005" cy="646331"/>
+          </a:xfrm>
+          <a:prstGeom prst="rect">
+            <a:avLst/>
+          </a:prstGeom>
+          <a:solidFill>
+            <a:schemeClr val="bg1"/>
+          </a:solidFill>
+        </p:spPr>
+        <p:txBody>
+          <a:bodyPr wrap="none" rtlCol="0">
+            <a:spAutoFit/>
+          </a:bodyPr>
+          <a:lstStyle/>
+          <a:p>
+            <a:pPr algn="ctr"/>
+            <a:r>
+              <a:rPr lang="en-GB" dirty="0" err="1" smtClean="0"/>
+              <a:t>RAG</a:t>
+            </a:r>
+            <a:r>
+              <a:rPr lang="en-GB" baseline="30000" dirty="0" err="1" smtClean="0"/>
+              <a:t>low</a:t>
+            </a:r>
+            <a:endParaRPr lang="en-GB" baseline="30000" dirty="0" smtClean="0"/>
+          </a:p>
+          <a:p>
+            <a:pPr algn="ctr"/>
+            <a:r>
+              <a:rPr lang="en-GB" dirty="0" smtClean="0"/>
+              <a:t>9.47%</a:t>
+            </a:r>
+            <a:endParaRPr lang="en-GB" dirty="0"/>
+          </a:p>
+        </p:txBody>
+      </p:sp>
+      <p:sp>
+        <p:nvSpPr>
+          <p:cNvPr id="9" name="TextBox 8"/>
+          <p:cNvSpPr txBox="1"/>
+          <p:nvPr/>
+        </p:nvSpPr>
+        <p:spPr>
+          <a:xfrm>
+            <a:off x="5966837" y="809105"/>
+            <a:ext cx="854658" cy="646331"/>
+          </a:xfrm>
+          <a:prstGeom prst="rect">
+            <a:avLst/>
+          </a:prstGeom>
+          <a:solidFill>
+            <a:schemeClr val="bg1"/>
+          </a:solidFill>
+        </p:spPr>
+        <p:txBody>
+          <a:bodyPr wrap="none" rtlCol="0">
+            <a:spAutoFit/>
+          </a:bodyPr>
+          <a:lstStyle/>
+          <a:p>
+            <a:pPr algn="ctr"/>
+            <a:r>
+              <a:rPr lang="en-GB" dirty="0" err="1" smtClean="0"/>
+              <a:t>RAG</a:t>
+            </a:r>
+            <a:r>
+              <a:rPr lang="en-GB" baseline="30000" dirty="0" err="1" smtClean="0"/>
+              <a:t>high</a:t>
+            </a:r>
+            <a:endParaRPr lang="en-GB" baseline="30000" dirty="0" smtClean="0"/>
+          </a:p>
+          <a:p>
+            <a:pPr algn="ctr"/>
+            <a:r>
+              <a:rPr lang="en-GB" dirty="0" smtClean="0"/>
+              <a:t>51.5%</a:t>
+            </a:r>
+            <a:endParaRPr lang="en-GB" dirty="0"/>
+          </a:p>
+        </p:txBody>
+      </p:sp>
+      <p:sp>
+        <p:nvSpPr>
+          <p:cNvPr id="11" name="TextBox 10"/>
+          <p:cNvSpPr txBox="1"/>
+          <p:nvPr/>
+        </p:nvSpPr>
+        <p:spPr>
+          <a:xfrm>
+            <a:off x="7972934" y="809451"/>
+            <a:ext cx="758541" cy="646331"/>
+          </a:xfrm>
+          <a:prstGeom prst="rect">
+            <a:avLst/>
+          </a:prstGeom>
+          <a:solidFill>
+            <a:schemeClr val="bg1"/>
+          </a:solidFill>
+        </p:spPr>
+        <p:txBody>
+          <a:bodyPr wrap="none" rtlCol="0">
+            <a:spAutoFit/>
+          </a:bodyPr>
+          <a:lstStyle/>
+          <a:p>
+            <a:pPr algn="ctr"/>
+            <a:r>
+              <a:rPr lang="en-GB" dirty="0" smtClean="0"/>
+              <a:t>RAG-</a:t>
+            </a:r>
+          </a:p>
+          <a:p>
+            <a:pPr algn="ctr"/>
+            <a:r>
+              <a:rPr lang="en-GB" dirty="0" smtClean="0"/>
+              <a:t>49.4%</a:t>
+            </a:r>
+            <a:endParaRPr lang="en-GB" dirty="0"/>
+          </a:p>
+        </p:txBody>
+      </p:sp>
+      <p:sp>
+        <p:nvSpPr>
+          <p:cNvPr id="12" name="TextBox 11"/>
+          <p:cNvSpPr txBox="1"/>
+          <p:nvPr/>
+        </p:nvSpPr>
+        <p:spPr>
+          <a:xfrm>
+            <a:off x="8691979" y="809451"/>
+            <a:ext cx="814005" cy="646331"/>
+          </a:xfrm>
+          <a:prstGeom prst="rect">
+            <a:avLst/>
+          </a:prstGeom>
+          <a:solidFill>
+            <a:schemeClr val="bg1"/>
+          </a:solidFill>
+        </p:spPr>
+        <p:txBody>
+          <a:bodyPr wrap="none" rtlCol="0">
+            <a:spAutoFit/>
+          </a:bodyPr>
+          <a:lstStyle/>
+          <a:p>
+            <a:pPr algn="ctr"/>
+            <a:r>
+              <a:rPr lang="en-GB" dirty="0" err="1" smtClean="0"/>
+              <a:t>RAG</a:t>
+            </a:r>
+            <a:r>
+              <a:rPr lang="en-GB" baseline="30000" dirty="0" err="1" smtClean="0"/>
+              <a:t>low</a:t>
+            </a:r>
+            <a:endParaRPr lang="en-GB" baseline="30000" dirty="0" smtClean="0"/>
+          </a:p>
+          <a:p>
+            <a:pPr algn="ctr"/>
+            <a:r>
+              <a:rPr lang="en-GB" dirty="0" smtClean="0"/>
+              <a:t>9.81%</a:t>
+            </a:r>
+            <a:endParaRPr lang="en-GB" dirty="0"/>
+          </a:p>
+        </p:txBody>
+      </p:sp>
+      <p:sp>
+        <p:nvSpPr>
+          <p:cNvPr id="13" name="TextBox 12"/>
+          <p:cNvSpPr txBox="1"/>
+          <p:nvPr/>
+        </p:nvSpPr>
+        <p:spPr>
+          <a:xfrm>
+            <a:off x="9495533" y="809451"/>
+            <a:ext cx="875561" cy="646331"/>
+          </a:xfrm>
+          <a:prstGeom prst="rect">
+            <a:avLst/>
+          </a:prstGeom>
+          <a:solidFill>
+            <a:schemeClr val="bg1"/>
+          </a:solidFill>
+        </p:spPr>
+        <p:txBody>
+          <a:bodyPr wrap="none" rtlCol="0">
+            <a:spAutoFit/>
+          </a:bodyPr>
+          <a:lstStyle/>
+          <a:p>
+            <a:pPr algn="ctr"/>
+            <a:r>
+              <a:rPr lang="en-GB" dirty="0" err="1" smtClean="0"/>
+              <a:t>RAG</a:t>
+            </a:r>
+            <a:r>
+              <a:rPr lang="en-GB" baseline="30000" dirty="0" err="1" smtClean="0"/>
+              <a:t>high</a:t>
+            </a:r>
+            <a:endParaRPr lang="en-GB" baseline="30000" dirty="0" smtClean="0"/>
+          </a:p>
+          <a:p>
+            <a:pPr algn="ctr"/>
+            <a:r>
+              <a:rPr lang="en-GB" dirty="0" smtClean="0"/>
+              <a:t>38.2%</a:t>
+            </a:r>
+            <a:endParaRPr lang="en-GB" dirty="0"/>
+          </a:p>
+        </p:txBody>
+      </p:sp>
+      <p:sp>
+        <p:nvSpPr>
+          <p:cNvPr id="14" name="TextBox 13"/>
+          <p:cNvSpPr txBox="1"/>
+          <p:nvPr/>
+        </p:nvSpPr>
+        <p:spPr>
+          <a:xfrm rot="16200000">
+            <a:off x="-457590" y="2059265"/>
+            <a:ext cx="1652697" cy="461665"/>
+          </a:xfrm>
+          <a:prstGeom prst="rect">
+            <a:avLst/>
+          </a:prstGeom>
+          <a:solidFill>
+            <a:schemeClr val="bg1"/>
+          </a:solidFill>
+        </p:spPr>
+        <p:txBody>
+          <a:bodyPr wrap="none" rtlCol="0">
+            <a:spAutoFit/>
+          </a:bodyPr>
+          <a:lstStyle/>
+          <a:p>
+            <a:r>
+              <a:rPr lang="en-GB" sz="2400" dirty="0" smtClean="0"/>
+              <a:t>Side Scatter</a:t>
+            </a:r>
+            <a:endParaRPr lang="en-GB" sz="2400" dirty="0"/>
+          </a:p>
+        </p:txBody>
+      </p:sp>
+      <p:sp>
+        <p:nvSpPr>
+          <p:cNvPr id="15" name="TextBox 14"/>
+          <p:cNvSpPr txBox="1"/>
+          <p:nvPr/>
+        </p:nvSpPr>
+        <p:spPr>
+          <a:xfrm rot="16200000">
+            <a:off x="3042294" y="2059265"/>
+            <a:ext cx="1652697" cy="461665"/>
+          </a:xfrm>
+          <a:prstGeom prst="rect">
+            <a:avLst/>
+          </a:prstGeom>
+          <a:solidFill>
+            <a:schemeClr val="bg1"/>
+          </a:solidFill>
+        </p:spPr>
+        <p:txBody>
+          <a:bodyPr wrap="none" rtlCol="0">
+            <a:spAutoFit/>
+          </a:bodyPr>
+          <a:lstStyle/>
+          <a:p>
+            <a:r>
+              <a:rPr lang="en-GB" sz="2400" dirty="0" smtClean="0"/>
+              <a:t>Side Scatter</a:t>
+            </a:r>
+            <a:endParaRPr lang="en-GB" sz="2400" dirty="0"/>
+          </a:p>
+        </p:txBody>
+      </p:sp>
+      <p:sp>
+        <p:nvSpPr>
+          <p:cNvPr id="16" name="TextBox 15"/>
+          <p:cNvSpPr txBox="1"/>
+          <p:nvPr/>
+        </p:nvSpPr>
+        <p:spPr>
+          <a:xfrm rot="16200000">
+            <a:off x="6526869" y="2059265"/>
+            <a:ext cx="1652697" cy="461665"/>
+          </a:xfrm>
+          <a:prstGeom prst="rect">
+            <a:avLst/>
+          </a:prstGeom>
+          <a:solidFill>
+            <a:schemeClr val="bg1"/>
+          </a:solidFill>
+        </p:spPr>
+        <p:txBody>
+          <a:bodyPr wrap="none" rtlCol="0">
+            <a:spAutoFit/>
+          </a:bodyPr>
+          <a:lstStyle/>
+          <a:p>
+            <a:r>
+              <a:rPr lang="en-GB" sz="2400" dirty="0" smtClean="0"/>
+              <a:t>Side Scatter</a:t>
+            </a:r>
+            <a:endParaRPr lang="en-GB" sz="2400" dirty="0"/>
+          </a:p>
+        </p:txBody>
+      </p:sp>
+      <p:sp>
+        <p:nvSpPr>
+          <p:cNvPr id="17" name="TextBox 16"/>
+          <p:cNvSpPr txBox="1"/>
+          <p:nvPr/>
+        </p:nvSpPr>
+        <p:spPr>
+          <a:xfrm>
+            <a:off x="931022" y="3341719"/>
+            <a:ext cx="2402382" cy="461665"/>
+          </a:xfrm>
+          <a:prstGeom prst="rect">
+            <a:avLst/>
+          </a:prstGeom>
+          <a:solidFill>
+            <a:schemeClr val="bg1"/>
+          </a:solidFill>
+        </p:spPr>
+        <p:txBody>
+          <a:bodyPr wrap="square" rtlCol="0">
+            <a:spAutoFit/>
+          </a:bodyPr>
+          <a:lstStyle/>
+          <a:p>
+            <a:r>
+              <a:rPr lang="en-GB" sz="2400" dirty="0" smtClean="0"/>
+              <a:t>RAG</a:t>
+            </a:r>
+            <a:endParaRPr lang="en-GB" sz="2400" dirty="0"/>
+          </a:p>
+        </p:txBody>
+      </p:sp>
+      <p:sp>
+        <p:nvSpPr>
+          <p:cNvPr id="18" name="TextBox 17"/>
+          <p:cNvSpPr txBox="1"/>
+          <p:nvPr/>
+        </p:nvSpPr>
+        <p:spPr>
+          <a:xfrm>
+            <a:off x="4444535" y="3341719"/>
+            <a:ext cx="2189020" cy="461665"/>
+          </a:xfrm>
+          <a:prstGeom prst="rect">
+            <a:avLst/>
+          </a:prstGeom>
+          <a:solidFill>
+            <a:schemeClr val="bg1"/>
+          </a:solidFill>
+        </p:spPr>
+        <p:txBody>
+          <a:bodyPr wrap="square" rtlCol="0">
+            <a:spAutoFit/>
+          </a:bodyPr>
+          <a:lstStyle/>
+          <a:p>
+            <a:r>
+              <a:rPr lang="en-GB" sz="2400" dirty="0" smtClean="0"/>
+              <a:t>RAG</a:t>
+            </a:r>
+            <a:endParaRPr lang="en-GB" sz="2400" dirty="0"/>
+          </a:p>
+        </p:txBody>
+      </p:sp>
+      <p:sp>
+        <p:nvSpPr>
+          <p:cNvPr id="19" name="TextBox 18"/>
+          <p:cNvSpPr txBox="1"/>
+          <p:nvPr/>
+        </p:nvSpPr>
+        <p:spPr>
+          <a:xfrm>
+            <a:off x="7924796" y="3346187"/>
+            <a:ext cx="1965431" cy="461665"/>
+          </a:xfrm>
+          <a:prstGeom prst="rect">
+            <a:avLst/>
+          </a:prstGeom>
+          <a:solidFill>
+            <a:schemeClr val="bg1"/>
+          </a:solidFill>
+        </p:spPr>
+        <p:txBody>
+          <a:bodyPr wrap="square" rtlCol="0">
+            <a:spAutoFit/>
+          </a:bodyPr>
+          <a:lstStyle/>
+          <a:p>
+            <a:r>
+              <a:rPr lang="en-GB" sz="2400" dirty="0" smtClean="0"/>
+              <a:t>RAG</a:t>
+            </a:r>
+            <a:endParaRPr lang="en-GB" sz="2400" dirty="0"/>
+          </a:p>
+        </p:txBody>
+      </p:sp>
+      <p:sp>
+        <p:nvSpPr>
+          <p:cNvPr id="20" name="TextBox 19"/>
+          <p:cNvSpPr txBox="1"/>
+          <p:nvPr/>
+        </p:nvSpPr>
+        <p:spPr>
+          <a:xfrm>
+            <a:off x="1380182" y="99753"/>
+            <a:ext cx="940322" cy="369332"/>
+          </a:xfrm>
+          <a:prstGeom prst="rect">
+            <a:avLst/>
+          </a:prstGeom>
+          <a:noFill/>
+        </p:spPr>
+        <p:txBody>
+          <a:bodyPr wrap="none" rtlCol="0">
+            <a:spAutoFit/>
+          </a:bodyPr>
+          <a:lstStyle/>
+          <a:p>
+            <a:r>
+              <a:rPr lang="en-GB" dirty="0" smtClean="0"/>
+              <a:t>4 weeks</a:t>
+            </a:r>
+            <a:endParaRPr lang="en-GB" dirty="0"/>
+          </a:p>
+        </p:txBody>
+      </p:sp>
+      <p:sp>
+        <p:nvSpPr>
+          <p:cNvPr id="21" name="TextBox 20"/>
+          <p:cNvSpPr txBox="1"/>
+          <p:nvPr/>
+        </p:nvSpPr>
+        <p:spPr>
+          <a:xfrm>
+            <a:off x="5068884" y="99753"/>
+            <a:ext cx="940322" cy="369332"/>
+          </a:xfrm>
+          <a:prstGeom prst="rect">
+            <a:avLst/>
+          </a:prstGeom>
+          <a:noFill/>
+        </p:spPr>
+        <p:txBody>
+          <a:bodyPr wrap="none" rtlCol="0">
+            <a:spAutoFit/>
+          </a:bodyPr>
+          <a:lstStyle/>
+          <a:p>
+            <a:r>
+              <a:rPr lang="en-GB" dirty="0"/>
+              <a:t>7</a:t>
+            </a:r>
+            <a:r>
+              <a:rPr lang="en-GB" dirty="0" smtClean="0"/>
+              <a:t> weeks</a:t>
+            </a:r>
+            <a:endParaRPr lang="en-GB" dirty="0"/>
+          </a:p>
+        </p:txBody>
+      </p:sp>
+      <p:sp>
+        <p:nvSpPr>
+          <p:cNvPr id="22" name="TextBox 21"/>
+          <p:cNvSpPr txBox="1"/>
+          <p:nvPr/>
+        </p:nvSpPr>
+        <p:spPr>
+          <a:xfrm>
+            <a:off x="8520432" y="99753"/>
+            <a:ext cx="1057341" cy="369332"/>
+          </a:xfrm>
+          <a:prstGeom prst="rect">
+            <a:avLst/>
+          </a:prstGeom>
+          <a:noFill/>
+        </p:spPr>
+        <p:txBody>
+          <a:bodyPr wrap="none" rtlCol="0">
+            <a:spAutoFit/>
+          </a:bodyPr>
+          <a:lstStyle/>
+          <a:p>
+            <a:r>
+              <a:rPr lang="en-GB" dirty="0" smtClean="0"/>
+              <a:t>11 weeks</a:t>
+            </a:r>
+            <a:endParaRPr lang="en-GB" dirty="0"/>
+          </a:p>
+        </p:txBody>
+      </p:sp>
+    </p:spTree>
+    <p:extLst>
+      <p:ext uri="{BB962C8B-B14F-4D97-AF65-F5344CB8AC3E}">
+        <p14:creationId xmlns:p14="http://schemas.microsoft.com/office/powerpoint/2010/main" val="1273586035"/>
       </p:ext>
     </p:extLst>
   </p:cSld>
@@ -6338,7 +8192,7 @@
           <a:lstStyle/>
           <a:p>
             <a:r>
-              <a:rPr lang="en-GB" sz="2400" smtClean="0"/>
+              <a:rPr lang="en-GB" sz="2400" dirty="0" smtClean="0"/>
               <a:t>IgM</a:t>
             </a:r>
             <a:endParaRPr lang="en-GB" sz="2400" dirty="0"/>
@@ -6585,6 +8439,586 @@
     <p:extLst>
       <p:ext uri="{BB962C8B-B14F-4D97-AF65-F5344CB8AC3E}">
         <p14:creationId xmlns:p14="http://schemas.microsoft.com/office/powerpoint/2010/main" val="144376015"/>
+      </p:ext>
+    </p:extLst>
+  </p:cSld>
+  <p:clrMapOvr>
+    <a:masterClrMapping/>
+  </p:clrMapOvr>
+</p:sld>
+</file>
+
+<file path=ppt/slides/slide9.xml><?xml version="1.0" encoding="utf-8"?>
+<p:sld xmlns:a="http://schemas.openxmlformats.org/drawingml/2006/main" xmlns:r="http://schemas.openxmlformats.org/officeDocument/2006/relationships" xmlns:p="http://schemas.openxmlformats.org/presentationml/2006/main">
+  <p:cSld>
+    <p:spTree>
+      <p:nvGrpSpPr>
+        <p:cNvPr id="1" name=""/>
+        <p:cNvGrpSpPr/>
+        <p:nvPr/>
+      </p:nvGrpSpPr>
+      <p:grpSpPr>
+        <a:xfrm>
+          <a:off x="0" y="0"/>
+          <a:ext cx="0" cy="0"/>
+          <a:chOff x="0" y="0"/>
+          <a:chExt cx="0" cy="0"/>
+        </a:xfrm>
+      </p:grpSpPr>
+      <p:pic>
+        <p:nvPicPr>
+          <p:cNvPr id="22" name="Picture 21"/>
+          <p:cNvPicPr>
+            <a:picLocks noChangeAspect="1"/>
+          </p:cNvPicPr>
+          <p:nvPr/>
+        </p:nvPicPr>
+        <p:blipFill>
+          <a:blip r:embed="rId3"/>
+          <a:stretch>
+            <a:fillRect/>
+          </a:stretch>
+        </p:blipFill>
+        <p:spPr>
+          <a:xfrm>
+            <a:off x="97747" y="260093"/>
+            <a:ext cx="3505200" cy="3638550"/>
+          </a:xfrm>
+          <a:prstGeom prst="rect">
+            <a:avLst/>
+          </a:prstGeom>
+        </p:spPr>
+      </p:pic>
+      <p:pic>
+        <p:nvPicPr>
+          <p:cNvPr id="21" name="Picture 20"/>
+          <p:cNvPicPr>
+            <a:picLocks noChangeAspect="1"/>
+          </p:cNvPicPr>
+          <p:nvPr/>
+        </p:nvPicPr>
+        <p:blipFill>
+          <a:blip r:embed="rId4"/>
+          <a:stretch>
+            <a:fillRect/>
+          </a:stretch>
+        </p:blipFill>
+        <p:spPr>
+          <a:xfrm>
+            <a:off x="3649297" y="260093"/>
+            <a:ext cx="3505200" cy="3638550"/>
+          </a:xfrm>
+          <a:prstGeom prst="rect">
+            <a:avLst/>
+          </a:prstGeom>
+        </p:spPr>
+      </p:pic>
+      <p:pic>
+        <p:nvPicPr>
+          <p:cNvPr id="20" name="Picture 19"/>
+          <p:cNvPicPr>
+            <a:picLocks noChangeAspect="1"/>
+          </p:cNvPicPr>
+          <p:nvPr/>
+        </p:nvPicPr>
+        <p:blipFill>
+          <a:blip r:embed="rId5"/>
+          <a:stretch>
+            <a:fillRect/>
+          </a:stretch>
+        </p:blipFill>
+        <p:spPr>
+          <a:xfrm>
+            <a:off x="7196815" y="260093"/>
+            <a:ext cx="3505200" cy="3638550"/>
+          </a:xfrm>
+          <a:prstGeom prst="rect">
+            <a:avLst/>
+          </a:prstGeom>
+        </p:spPr>
+      </p:pic>
+      <p:sp>
+        <p:nvSpPr>
+          <p:cNvPr id="5" name="TextBox 4"/>
+          <p:cNvSpPr txBox="1"/>
+          <p:nvPr/>
+        </p:nvSpPr>
+        <p:spPr>
+          <a:xfrm>
+            <a:off x="1380186" y="99753"/>
+            <a:ext cx="940322" cy="369332"/>
+          </a:xfrm>
+          <a:prstGeom prst="rect">
+            <a:avLst/>
+          </a:prstGeom>
+          <a:noFill/>
+        </p:spPr>
+        <p:txBody>
+          <a:bodyPr wrap="none" rtlCol="0">
+            <a:spAutoFit/>
+          </a:bodyPr>
+          <a:lstStyle/>
+          <a:p>
+            <a:r>
+              <a:rPr lang="en-GB" dirty="0" smtClean="0"/>
+              <a:t>4 weeks</a:t>
+            </a:r>
+            <a:endParaRPr lang="en-GB" dirty="0"/>
+          </a:p>
+        </p:txBody>
+      </p:sp>
+      <p:sp>
+        <p:nvSpPr>
+          <p:cNvPr id="6" name="TextBox 5"/>
+          <p:cNvSpPr txBox="1"/>
+          <p:nvPr/>
+        </p:nvSpPr>
+        <p:spPr>
+          <a:xfrm>
+            <a:off x="4929720" y="99753"/>
+            <a:ext cx="940322" cy="369332"/>
+          </a:xfrm>
+          <a:prstGeom prst="rect">
+            <a:avLst/>
+          </a:prstGeom>
+          <a:noFill/>
+        </p:spPr>
+        <p:txBody>
+          <a:bodyPr wrap="none" rtlCol="0">
+            <a:spAutoFit/>
+          </a:bodyPr>
+          <a:lstStyle/>
+          <a:p>
+            <a:r>
+              <a:rPr lang="en-GB" dirty="0"/>
+              <a:t>7</a:t>
+            </a:r>
+            <a:r>
+              <a:rPr lang="en-GB" dirty="0" smtClean="0"/>
+              <a:t> weeks</a:t>
+            </a:r>
+            <a:endParaRPr lang="en-GB" dirty="0"/>
+          </a:p>
+        </p:txBody>
+      </p:sp>
+      <p:sp>
+        <p:nvSpPr>
+          <p:cNvPr id="7" name="TextBox 6"/>
+          <p:cNvSpPr txBox="1"/>
+          <p:nvPr/>
+        </p:nvSpPr>
+        <p:spPr>
+          <a:xfrm>
+            <a:off x="8420744" y="99753"/>
+            <a:ext cx="1057341" cy="369332"/>
+          </a:xfrm>
+          <a:prstGeom prst="rect">
+            <a:avLst/>
+          </a:prstGeom>
+          <a:noFill/>
+        </p:spPr>
+        <p:txBody>
+          <a:bodyPr wrap="none" rtlCol="0">
+            <a:spAutoFit/>
+          </a:bodyPr>
+          <a:lstStyle/>
+          <a:p>
+            <a:r>
+              <a:rPr lang="en-GB" dirty="0" smtClean="0"/>
+              <a:t>11 weeks</a:t>
+            </a:r>
+            <a:endParaRPr lang="en-GB" dirty="0"/>
+          </a:p>
+        </p:txBody>
+      </p:sp>
+      <p:sp>
+        <p:nvSpPr>
+          <p:cNvPr id="8" name="TextBox 7"/>
+          <p:cNvSpPr txBox="1"/>
+          <p:nvPr/>
+        </p:nvSpPr>
+        <p:spPr>
+          <a:xfrm rot="16200000">
+            <a:off x="-704110" y="1769957"/>
+            <a:ext cx="2176216" cy="461665"/>
+          </a:xfrm>
+          <a:prstGeom prst="rect">
+            <a:avLst/>
+          </a:prstGeom>
+          <a:solidFill>
+            <a:schemeClr val="bg1"/>
+          </a:solidFill>
+        </p:spPr>
+        <p:txBody>
+          <a:bodyPr wrap="square" rtlCol="0">
+            <a:spAutoFit/>
+          </a:bodyPr>
+          <a:lstStyle/>
+          <a:p>
+            <a:r>
+              <a:rPr lang="en-GB" sz="2400" dirty="0" smtClean="0"/>
+              <a:t>IgM</a:t>
+            </a:r>
+            <a:endParaRPr lang="en-GB" sz="2400" dirty="0"/>
+          </a:p>
+        </p:txBody>
+      </p:sp>
+      <p:sp>
+        <p:nvSpPr>
+          <p:cNvPr id="9" name="TextBox 8"/>
+          <p:cNvSpPr txBox="1"/>
+          <p:nvPr/>
+        </p:nvSpPr>
+        <p:spPr>
+          <a:xfrm rot="16200000">
+            <a:off x="2845424" y="1771676"/>
+            <a:ext cx="2176216" cy="461665"/>
+          </a:xfrm>
+          <a:prstGeom prst="rect">
+            <a:avLst/>
+          </a:prstGeom>
+          <a:solidFill>
+            <a:schemeClr val="bg1"/>
+          </a:solidFill>
+        </p:spPr>
+        <p:txBody>
+          <a:bodyPr wrap="square" rtlCol="0">
+            <a:spAutoFit/>
+          </a:bodyPr>
+          <a:lstStyle/>
+          <a:p>
+            <a:r>
+              <a:rPr lang="en-GB" sz="2400" dirty="0" smtClean="0"/>
+              <a:t>IgM</a:t>
+            </a:r>
+            <a:endParaRPr lang="en-GB" sz="2400" dirty="0"/>
+          </a:p>
+        </p:txBody>
+      </p:sp>
+      <p:sp>
+        <p:nvSpPr>
+          <p:cNvPr id="10" name="TextBox 9"/>
+          <p:cNvSpPr txBox="1"/>
+          <p:nvPr/>
+        </p:nvSpPr>
+        <p:spPr>
+          <a:xfrm rot="16200000">
+            <a:off x="6386649" y="1769957"/>
+            <a:ext cx="2176216" cy="461665"/>
+          </a:xfrm>
+          <a:prstGeom prst="rect">
+            <a:avLst/>
+          </a:prstGeom>
+          <a:solidFill>
+            <a:schemeClr val="bg1"/>
+          </a:solidFill>
+        </p:spPr>
+        <p:txBody>
+          <a:bodyPr wrap="square" rtlCol="0">
+            <a:spAutoFit/>
+          </a:bodyPr>
+          <a:lstStyle/>
+          <a:p>
+            <a:r>
+              <a:rPr lang="en-GB" sz="2400" dirty="0" smtClean="0"/>
+              <a:t>IgM</a:t>
+            </a:r>
+            <a:endParaRPr lang="en-GB" sz="2400" dirty="0"/>
+          </a:p>
+        </p:txBody>
+      </p:sp>
+      <p:sp>
+        <p:nvSpPr>
+          <p:cNvPr id="11" name="TextBox 10"/>
+          <p:cNvSpPr txBox="1"/>
+          <p:nvPr/>
+        </p:nvSpPr>
+        <p:spPr>
+          <a:xfrm>
+            <a:off x="931022" y="3341719"/>
+            <a:ext cx="2402382" cy="461665"/>
+          </a:xfrm>
+          <a:prstGeom prst="rect">
+            <a:avLst/>
+          </a:prstGeom>
+          <a:solidFill>
+            <a:schemeClr val="bg1"/>
+          </a:solidFill>
+        </p:spPr>
+        <p:txBody>
+          <a:bodyPr wrap="square" rtlCol="0">
+            <a:spAutoFit/>
+          </a:bodyPr>
+          <a:lstStyle/>
+          <a:p>
+            <a:r>
+              <a:rPr lang="en-GB" sz="2400" dirty="0" smtClean="0"/>
+              <a:t>CD43</a:t>
+            </a:r>
+            <a:endParaRPr lang="en-GB" sz="2400" dirty="0"/>
+          </a:p>
+        </p:txBody>
+      </p:sp>
+      <p:sp>
+        <p:nvSpPr>
+          <p:cNvPr id="12" name="TextBox 11"/>
+          <p:cNvSpPr txBox="1"/>
+          <p:nvPr/>
+        </p:nvSpPr>
+        <p:spPr>
+          <a:xfrm>
+            <a:off x="4486100" y="3341719"/>
+            <a:ext cx="2189020" cy="461665"/>
+          </a:xfrm>
+          <a:prstGeom prst="rect">
+            <a:avLst/>
+          </a:prstGeom>
+          <a:solidFill>
+            <a:schemeClr val="bg1"/>
+          </a:solidFill>
+        </p:spPr>
+        <p:txBody>
+          <a:bodyPr wrap="square" rtlCol="0">
+            <a:spAutoFit/>
+          </a:bodyPr>
+          <a:lstStyle/>
+          <a:p>
+            <a:r>
+              <a:rPr lang="en-GB" sz="2400" dirty="0" smtClean="0"/>
+              <a:t>CD43</a:t>
+            </a:r>
+            <a:endParaRPr lang="en-GB" sz="2400" dirty="0"/>
+          </a:p>
+        </p:txBody>
+      </p:sp>
+      <p:sp>
+        <p:nvSpPr>
+          <p:cNvPr id="13" name="TextBox 12"/>
+          <p:cNvSpPr txBox="1"/>
+          <p:nvPr/>
+        </p:nvSpPr>
+        <p:spPr>
+          <a:xfrm>
+            <a:off x="8016239" y="3346187"/>
+            <a:ext cx="1965431" cy="461665"/>
+          </a:xfrm>
+          <a:prstGeom prst="rect">
+            <a:avLst/>
+          </a:prstGeom>
+          <a:solidFill>
+            <a:schemeClr val="bg1"/>
+          </a:solidFill>
+        </p:spPr>
+        <p:txBody>
+          <a:bodyPr wrap="square" rtlCol="0">
+            <a:spAutoFit/>
+          </a:bodyPr>
+          <a:lstStyle/>
+          <a:p>
+            <a:r>
+              <a:rPr lang="en-GB" sz="2400" dirty="0" smtClean="0"/>
+              <a:t>CD43</a:t>
+            </a:r>
+            <a:endParaRPr lang="en-GB" sz="2400" dirty="0"/>
+          </a:p>
+        </p:txBody>
+      </p:sp>
+      <p:sp>
+        <p:nvSpPr>
+          <p:cNvPr id="14" name="TextBox 13"/>
+          <p:cNvSpPr txBox="1"/>
+          <p:nvPr/>
+        </p:nvSpPr>
+        <p:spPr>
+          <a:xfrm>
+            <a:off x="2823543" y="2682612"/>
+            <a:ext cx="501548" cy="369332"/>
+          </a:xfrm>
+          <a:prstGeom prst="rect">
+            <a:avLst/>
+          </a:prstGeom>
+          <a:solidFill>
+            <a:schemeClr val="bg1"/>
+          </a:solidFill>
+        </p:spPr>
+        <p:txBody>
+          <a:bodyPr wrap="none" rtlCol="0">
+            <a:spAutoFit/>
+          </a:bodyPr>
+          <a:lstStyle/>
+          <a:p>
+            <a:r>
+              <a:rPr lang="en-GB" dirty="0" smtClean="0"/>
+              <a:t>Pro</a:t>
+            </a:r>
+            <a:endParaRPr lang="en-GB" dirty="0"/>
+          </a:p>
+        </p:txBody>
+      </p:sp>
+      <p:sp>
+        <p:nvSpPr>
+          <p:cNvPr id="15" name="TextBox 14"/>
+          <p:cNvSpPr txBox="1"/>
+          <p:nvPr/>
+        </p:nvSpPr>
+        <p:spPr>
+          <a:xfrm>
+            <a:off x="6379374" y="2682612"/>
+            <a:ext cx="501548" cy="369332"/>
+          </a:xfrm>
+          <a:prstGeom prst="rect">
+            <a:avLst/>
+          </a:prstGeom>
+          <a:solidFill>
+            <a:schemeClr val="bg1"/>
+          </a:solidFill>
+        </p:spPr>
+        <p:txBody>
+          <a:bodyPr wrap="none" rtlCol="0">
+            <a:spAutoFit/>
+          </a:bodyPr>
+          <a:lstStyle/>
+          <a:p>
+            <a:r>
+              <a:rPr lang="en-GB" dirty="0" smtClean="0"/>
+              <a:t>Pro</a:t>
+            </a:r>
+            <a:endParaRPr lang="en-GB" dirty="0"/>
+          </a:p>
+        </p:txBody>
+      </p:sp>
+      <p:sp>
+        <p:nvSpPr>
+          <p:cNvPr id="16" name="TextBox 15"/>
+          <p:cNvSpPr txBox="1"/>
+          <p:nvPr/>
+        </p:nvSpPr>
+        <p:spPr>
+          <a:xfrm>
+            <a:off x="9925383" y="2682612"/>
+            <a:ext cx="501548" cy="369332"/>
+          </a:xfrm>
+          <a:prstGeom prst="rect">
+            <a:avLst/>
+          </a:prstGeom>
+          <a:solidFill>
+            <a:schemeClr val="bg1"/>
+          </a:solidFill>
+        </p:spPr>
+        <p:txBody>
+          <a:bodyPr wrap="none" rtlCol="0">
+            <a:spAutoFit/>
+          </a:bodyPr>
+          <a:lstStyle/>
+          <a:p>
+            <a:r>
+              <a:rPr lang="en-GB" dirty="0" smtClean="0"/>
+              <a:t>Pro</a:t>
+            </a:r>
+            <a:endParaRPr lang="en-GB" dirty="0"/>
+          </a:p>
+        </p:txBody>
+      </p:sp>
+      <p:sp>
+        <p:nvSpPr>
+          <p:cNvPr id="17" name="TextBox 16"/>
+          <p:cNvSpPr txBox="1"/>
+          <p:nvPr/>
+        </p:nvSpPr>
+        <p:spPr>
+          <a:xfrm>
+            <a:off x="8059182" y="2678767"/>
+            <a:ext cx="495841" cy="369332"/>
+          </a:xfrm>
+          <a:prstGeom prst="rect">
+            <a:avLst/>
+          </a:prstGeom>
+          <a:solidFill>
+            <a:schemeClr val="bg1"/>
+          </a:solidFill>
+        </p:spPr>
+        <p:txBody>
+          <a:bodyPr wrap="none" rtlCol="0">
+            <a:spAutoFit/>
+          </a:bodyPr>
+          <a:lstStyle/>
+          <a:p>
+            <a:r>
+              <a:rPr lang="en-GB" dirty="0" smtClean="0"/>
+              <a:t>Pre</a:t>
+            </a:r>
+            <a:endParaRPr lang="en-GB" dirty="0"/>
+          </a:p>
+        </p:txBody>
+      </p:sp>
+      <p:sp>
+        <p:nvSpPr>
+          <p:cNvPr id="18" name="TextBox 17"/>
+          <p:cNvSpPr txBox="1"/>
+          <p:nvPr/>
+        </p:nvSpPr>
+        <p:spPr>
+          <a:xfrm>
+            <a:off x="4502726" y="2675811"/>
+            <a:ext cx="495841" cy="369332"/>
+          </a:xfrm>
+          <a:prstGeom prst="rect">
+            <a:avLst/>
+          </a:prstGeom>
+          <a:solidFill>
+            <a:schemeClr val="bg1"/>
+          </a:solidFill>
+        </p:spPr>
+        <p:txBody>
+          <a:bodyPr wrap="none" rtlCol="0">
+            <a:spAutoFit/>
+          </a:bodyPr>
+          <a:lstStyle/>
+          <a:p>
+            <a:r>
+              <a:rPr lang="en-GB" dirty="0" smtClean="0"/>
+              <a:t>Pre</a:t>
+            </a:r>
+            <a:endParaRPr lang="en-GB" dirty="0"/>
+          </a:p>
+        </p:txBody>
+      </p:sp>
+      <p:sp>
+        <p:nvSpPr>
+          <p:cNvPr id="19" name="TextBox 18"/>
+          <p:cNvSpPr txBox="1"/>
+          <p:nvPr/>
+        </p:nvSpPr>
+        <p:spPr>
+          <a:xfrm>
+            <a:off x="952878" y="2675811"/>
+            <a:ext cx="495841" cy="369332"/>
+          </a:xfrm>
+          <a:prstGeom prst="rect">
+            <a:avLst/>
+          </a:prstGeom>
+          <a:solidFill>
+            <a:schemeClr val="bg1"/>
+          </a:solidFill>
+        </p:spPr>
+        <p:txBody>
+          <a:bodyPr wrap="none" rtlCol="0">
+            <a:spAutoFit/>
+          </a:bodyPr>
+          <a:lstStyle/>
+          <a:p>
+            <a:r>
+              <a:rPr lang="en-GB" dirty="0" smtClean="0"/>
+              <a:t>Pre</a:t>
+            </a:r>
+            <a:endParaRPr lang="en-GB" dirty="0"/>
+          </a:p>
+        </p:txBody>
+      </p:sp>
+    </p:spTree>
+    <p:extLst>
+      <p:ext uri="{BB962C8B-B14F-4D97-AF65-F5344CB8AC3E}">
+        <p14:creationId xmlns:p14="http://schemas.microsoft.com/office/powerpoint/2010/main" val="431469332"/>
       </p:ext>
     </p:extLst>
   </p:cSld>

</xml_diff>

<commit_message>
Added figures to Data Collection.
</commit_message>
<xml_diff>
--- a/Figures/Powerpoints/3 plots.pptx
+++ b/Figures/Powerpoints/3 plots.pptx
@@ -5,7 +5,7 @@
     <p:sldMasterId id="2147483672" r:id="rId1"/>
   </p:sldMasterIdLst>
   <p:notesMasterIdLst>
-    <p:notesMasterId r:id="rId13"/>
+    <p:notesMasterId r:id="rId14"/>
   </p:notesMasterIdLst>
   <p:sldIdLst>
     <p:sldId id="256" r:id="rId2"/>
@@ -19,6 +19,7 @@
     <p:sldId id="265" r:id="rId10"/>
     <p:sldId id="266" r:id="rId11"/>
     <p:sldId id="268" r:id="rId12"/>
+    <p:sldId id="269" r:id="rId13"/>
   </p:sldIdLst>
   <p:sldSz cx="10799763" cy="3959225"/>
   <p:notesSz cx="6858000" cy="9144000"/>
@@ -563,6 +564,100 @@
 </p:notes>
 </file>
 
+<file path=ppt/notesSlides/notesSlide10.xml><?xml version="1.0" encoding="utf-8"?>
+<p:notes xmlns:a="http://schemas.openxmlformats.org/drawingml/2006/main" xmlns:r="http://schemas.openxmlformats.org/officeDocument/2006/relationships" xmlns:p="http://schemas.openxmlformats.org/presentationml/2006/main">
+  <p:cSld>
+    <p:spTree>
+      <p:nvGrpSpPr>
+        <p:cNvPr id="1" name=""/>
+        <p:cNvGrpSpPr/>
+        <p:nvPr/>
+      </p:nvGrpSpPr>
+      <p:grpSpPr>
+        <a:xfrm>
+          <a:off x="0" y="0"/>
+          <a:ext cx="0" cy="0"/>
+          <a:chOff x="0" y="0"/>
+          <a:chExt cx="0" cy="0"/>
+        </a:xfrm>
+      </p:grpSpPr>
+      <p:sp>
+        <p:nvSpPr>
+          <p:cNvPr id="2" name="Slide Image Placeholder 1"/>
+          <p:cNvSpPr>
+            <a:spLocks noGrp="1" noRot="1" noChangeAspect="1"/>
+          </p:cNvSpPr>
+          <p:nvPr>
+            <p:ph type="sldImg"/>
+          </p:nvPr>
+        </p:nvSpPr>
+        <p:spPr/>
+      </p:sp>
+      <p:sp>
+        <p:nvSpPr>
+          <p:cNvPr id="3" name="Notes Placeholder 2"/>
+          <p:cNvSpPr>
+            <a:spLocks noGrp="1"/>
+          </p:cNvSpPr>
+          <p:nvPr>
+            <p:ph type="body" idx="1"/>
+          </p:nvPr>
+        </p:nvSpPr>
+        <p:spPr/>
+        <p:txBody>
+          <a:bodyPr/>
+          <a:lstStyle/>
+          <a:p>
+            <a:r>
+              <a:rPr lang="en-GB" dirty="0" smtClean="0"/>
+              <a:t>Mature B cell increases pro B cells</a:t>
+            </a:r>
+          </a:p>
+          <a:p>
+            <a:r>
+              <a:rPr lang="en-GB" dirty="0" smtClean="0"/>
+              <a:t>B6 (2), NOD (8), KO (5)</a:t>
+            </a:r>
+            <a:endParaRPr lang="en-GB" dirty="0"/>
+          </a:p>
+        </p:txBody>
+      </p:sp>
+      <p:sp>
+        <p:nvSpPr>
+          <p:cNvPr id="4" name="Slide Number Placeholder 3"/>
+          <p:cNvSpPr>
+            <a:spLocks noGrp="1"/>
+          </p:cNvSpPr>
+          <p:nvPr>
+            <p:ph type="sldNum" sz="quarter" idx="10"/>
+          </p:nvPr>
+        </p:nvSpPr>
+        <p:spPr/>
+        <p:txBody>
+          <a:bodyPr/>
+          <a:lstStyle/>
+          <a:p>
+            <a:fld id="{F9FE1E78-BF79-4B81-BC92-5B601D8D92F9}" type="slidenum">
+              <a:rPr lang="en-GB" smtClean="0"/>
+              <a:t>12</a:t>
+            </a:fld>
+            <a:endParaRPr lang="en-GB"/>
+          </a:p>
+        </p:txBody>
+      </p:sp>
+    </p:spTree>
+    <p:extLst>
+      <p:ext uri="{BB962C8B-B14F-4D97-AF65-F5344CB8AC3E}">
+        <p14:creationId xmlns:p14="http://schemas.microsoft.com/office/powerpoint/2010/main" val="2779991501"/>
+      </p:ext>
+    </p:extLst>
+  </p:cSld>
+  <p:clrMapOvr>
+    <a:masterClrMapping/>
+  </p:clrMapOvr>
+</p:notes>
+</file>
+
 <file path=ppt/notesSlides/notesSlide2.xml><?xml version="1.0" encoding="utf-8"?>
 <p:notes xmlns:a="http://schemas.openxmlformats.org/drawingml/2006/main" xmlns:r="http://schemas.openxmlformats.org/officeDocument/2006/relationships" xmlns:p="http://schemas.openxmlformats.org/presentationml/2006/main">
   <p:cSld>
@@ -5767,6 +5862,510 @@
     <p:extLst>
       <p:ext uri="{BB962C8B-B14F-4D97-AF65-F5344CB8AC3E}">
         <p14:creationId xmlns:p14="http://schemas.microsoft.com/office/powerpoint/2010/main" val="1273586035"/>
+      </p:ext>
+    </p:extLst>
+  </p:cSld>
+  <p:clrMapOvr>
+    <a:masterClrMapping/>
+  </p:clrMapOvr>
+</p:sld>
+</file>
+
+<file path=ppt/slides/slide12.xml><?xml version="1.0" encoding="utf-8"?>
+<p:sld xmlns:a="http://schemas.openxmlformats.org/drawingml/2006/main" xmlns:r="http://schemas.openxmlformats.org/officeDocument/2006/relationships" xmlns:p="http://schemas.openxmlformats.org/presentationml/2006/main">
+  <p:cSld>
+    <p:spTree>
+      <p:nvGrpSpPr>
+        <p:cNvPr id="1" name=""/>
+        <p:cNvGrpSpPr/>
+        <p:nvPr/>
+      </p:nvGrpSpPr>
+      <p:grpSpPr>
+        <a:xfrm>
+          <a:off x="0" y="0"/>
+          <a:ext cx="0" cy="0"/>
+          <a:chOff x="0" y="0"/>
+          <a:chExt cx="0" cy="0"/>
+        </a:xfrm>
+      </p:grpSpPr>
+      <p:pic>
+        <p:nvPicPr>
+          <p:cNvPr id="2" name="Picture 1"/>
+          <p:cNvPicPr>
+            <a:picLocks noChangeAspect="1"/>
+          </p:cNvPicPr>
+          <p:nvPr/>
+        </p:nvPicPr>
+        <p:blipFill>
+          <a:blip r:embed="rId3"/>
+          <a:stretch>
+            <a:fillRect/>
+          </a:stretch>
+        </p:blipFill>
+        <p:spPr>
+          <a:xfrm>
+            <a:off x="99752" y="260090"/>
+            <a:ext cx="3505200" cy="3638550"/>
+          </a:xfrm>
+          <a:prstGeom prst="rect">
+            <a:avLst/>
+          </a:prstGeom>
+        </p:spPr>
+      </p:pic>
+      <p:sp>
+        <p:nvSpPr>
+          <p:cNvPr id="3" name="TextBox 2"/>
+          <p:cNvSpPr txBox="1"/>
+          <p:nvPr/>
+        </p:nvSpPr>
+        <p:spPr>
+          <a:xfrm>
+            <a:off x="968378" y="1155473"/>
+            <a:ext cx="800220" cy="646331"/>
+          </a:xfrm>
+          <a:prstGeom prst="rect">
+            <a:avLst/>
+          </a:prstGeom>
+          <a:solidFill>
+            <a:schemeClr val="bg1"/>
+          </a:solidFill>
+        </p:spPr>
+        <p:txBody>
+          <a:bodyPr wrap="none" rtlCol="0">
+            <a:spAutoFit/>
+          </a:bodyPr>
+          <a:lstStyle/>
+          <a:p>
+            <a:pPr algn="ctr"/>
+            <a:r>
+              <a:rPr lang="en-GB" dirty="0" smtClean="0"/>
+              <a:t>CD19+</a:t>
+            </a:r>
+          </a:p>
+          <a:p>
+            <a:pPr algn="ctr"/>
+            <a:r>
+              <a:rPr lang="en-GB" dirty="0" smtClean="0"/>
+              <a:t>3.43%</a:t>
+            </a:r>
+            <a:endParaRPr lang="en-GB" dirty="0"/>
+          </a:p>
+        </p:txBody>
+      </p:sp>
+      <p:pic>
+        <p:nvPicPr>
+          <p:cNvPr id="4" name="Picture 3"/>
+          <p:cNvPicPr>
+            <a:picLocks noChangeAspect="1"/>
+          </p:cNvPicPr>
+          <p:nvPr/>
+        </p:nvPicPr>
+        <p:blipFill>
+          <a:blip r:embed="rId4"/>
+          <a:stretch>
+            <a:fillRect/>
+          </a:stretch>
+        </p:blipFill>
+        <p:spPr>
+          <a:xfrm>
+            <a:off x="7122001" y="260090"/>
+            <a:ext cx="3505200" cy="3638550"/>
+          </a:xfrm>
+          <a:prstGeom prst="rect">
+            <a:avLst/>
+          </a:prstGeom>
+        </p:spPr>
+      </p:pic>
+      <p:sp>
+        <p:nvSpPr>
+          <p:cNvPr id="5" name="TextBox 4"/>
+          <p:cNvSpPr txBox="1"/>
+          <p:nvPr/>
+        </p:nvSpPr>
+        <p:spPr>
+          <a:xfrm>
+            <a:off x="7987091" y="1155473"/>
+            <a:ext cx="800220" cy="646331"/>
+          </a:xfrm>
+          <a:prstGeom prst="rect">
+            <a:avLst/>
+          </a:prstGeom>
+          <a:solidFill>
+            <a:schemeClr val="bg1"/>
+          </a:solidFill>
+        </p:spPr>
+        <p:txBody>
+          <a:bodyPr wrap="none" rtlCol="0">
+            <a:spAutoFit/>
+          </a:bodyPr>
+          <a:lstStyle/>
+          <a:p>
+            <a:pPr algn="ctr"/>
+            <a:r>
+              <a:rPr lang="en-GB" dirty="0" smtClean="0"/>
+              <a:t>CD19+</a:t>
+            </a:r>
+          </a:p>
+          <a:p>
+            <a:pPr algn="ctr"/>
+            <a:r>
+              <a:rPr lang="en-GB" dirty="0" smtClean="0"/>
+              <a:t>1.24%</a:t>
+            </a:r>
+            <a:endParaRPr lang="en-GB" dirty="0"/>
+          </a:p>
+        </p:txBody>
+      </p:sp>
+      <p:sp>
+        <p:nvSpPr>
+          <p:cNvPr id="6" name="TextBox 5"/>
+          <p:cNvSpPr txBox="1"/>
+          <p:nvPr/>
+        </p:nvSpPr>
+        <p:spPr>
+          <a:xfrm rot="16200000">
+            <a:off x="-707645" y="1840948"/>
+            <a:ext cx="2176216" cy="461665"/>
+          </a:xfrm>
+          <a:prstGeom prst="rect">
+            <a:avLst/>
+          </a:prstGeom>
+          <a:solidFill>
+            <a:schemeClr val="bg1"/>
+          </a:solidFill>
+        </p:spPr>
+        <p:txBody>
+          <a:bodyPr wrap="square" rtlCol="0">
+            <a:spAutoFit/>
+          </a:bodyPr>
+          <a:lstStyle/>
+          <a:p>
+            <a:r>
+              <a:rPr lang="en-GB" sz="2400" dirty="0" smtClean="0"/>
+              <a:t>CD19</a:t>
+            </a:r>
+            <a:endParaRPr lang="en-GB" sz="2400" dirty="0"/>
+          </a:p>
+        </p:txBody>
+      </p:sp>
+      <p:sp>
+        <p:nvSpPr>
+          <p:cNvPr id="7" name="TextBox 6"/>
+          <p:cNvSpPr txBox="1"/>
+          <p:nvPr/>
+        </p:nvSpPr>
+        <p:spPr>
+          <a:xfrm>
+            <a:off x="894241" y="3344487"/>
+            <a:ext cx="1652697" cy="461665"/>
+          </a:xfrm>
+          <a:prstGeom prst="rect">
+            <a:avLst/>
+          </a:prstGeom>
+          <a:solidFill>
+            <a:schemeClr val="bg1"/>
+          </a:solidFill>
+        </p:spPr>
+        <p:txBody>
+          <a:bodyPr wrap="none" rtlCol="0">
+            <a:spAutoFit/>
+          </a:bodyPr>
+          <a:lstStyle/>
+          <a:p>
+            <a:r>
+              <a:rPr lang="en-GB" sz="2400" dirty="0" smtClean="0"/>
+              <a:t>Side Scatter</a:t>
+            </a:r>
+            <a:endParaRPr lang="en-GB" sz="2400" dirty="0"/>
+          </a:p>
+        </p:txBody>
+      </p:sp>
+      <p:sp>
+        <p:nvSpPr>
+          <p:cNvPr id="8" name="TextBox 7"/>
+          <p:cNvSpPr txBox="1"/>
+          <p:nvPr/>
+        </p:nvSpPr>
+        <p:spPr>
+          <a:xfrm rot="16200000">
+            <a:off x="6314604" y="1840948"/>
+            <a:ext cx="2176216" cy="461665"/>
+          </a:xfrm>
+          <a:prstGeom prst="rect">
+            <a:avLst/>
+          </a:prstGeom>
+          <a:solidFill>
+            <a:schemeClr val="bg1"/>
+          </a:solidFill>
+        </p:spPr>
+        <p:txBody>
+          <a:bodyPr wrap="square" rtlCol="0">
+            <a:spAutoFit/>
+          </a:bodyPr>
+          <a:lstStyle/>
+          <a:p>
+            <a:r>
+              <a:rPr lang="en-GB" sz="2400" dirty="0" smtClean="0"/>
+              <a:t>CD19</a:t>
+            </a:r>
+            <a:endParaRPr lang="en-GB" sz="2400" dirty="0"/>
+          </a:p>
+        </p:txBody>
+      </p:sp>
+      <p:sp>
+        <p:nvSpPr>
+          <p:cNvPr id="9" name="TextBox 8"/>
+          <p:cNvSpPr txBox="1"/>
+          <p:nvPr/>
+        </p:nvSpPr>
+        <p:spPr>
+          <a:xfrm>
+            <a:off x="7916490" y="3344487"/>
+            <a:ext cx="1652697" cy="461665"/>
+          </a:xfrm>
+          <a:prstGeom prst="rect">
+            <a:avLst/>
+          </a:prstGeom>
+          <a:solidFill>
+            <a:schemeClr val="bg1"/>
+          </a:solidFill>
+        </p:spPr>
+        <p:txBody>
+          <a:bodyPr wrap="none" rtlCol="0">
+            <a:spAutoFit/>
+          </a:bodyPr>
+          <a:lstStyle/>
+          <a:p>
+            <a:r>
+              <a:rPr lang="en-GB" sz="2400" dirty="0" smtClean="0"/>
+              <a:t>Side Scatter</a:t>
+            </a:r>
+            <a:endParaRPr lang="en-GB" sz="2400" dirty="0"/>
+          </a:p>
+        </p:txBody>
+      </p:sp>
+      <p:pic>
+        <p:nvPicPr>
+          <p:cNvPr id="11" name="Picture 10"/>
+          <p:cNvPicPr>
+            <a:picLocks noChangeAspect="1"/>
+          </p:cNvPicPr>
+          <p:nvPr/>
+        </p:nvPicPr>
+        <p:blipFill>
+          <a:blip r:embed="rId5"/>
+          <a:stretch>
+            <a:fillRect/>
+          </a:stretch>
+        </p:blipFill>
+        <p:spPr>
+          <a:xfrm>
+            <a:off x="3610877" y="260090"/>
+            <a:ext cx="3505200" cy="3638550"/>
+          </a:xfrm>
+          <a:prstGeom prst="rect">
+            <a:avLst/>
+          </a:prstGeom>
+        </p:spPr>
+      </p:pic>
+      <p:sp>
+        <p:nvSpPr>
+          <p:cNvPr id="12" name="TextBox 11"/>
+          <p:cNvSpPr txBox="1"/>
+          <p:nvPr/>
+        </p:nvSpPr>
+        <p:spPr>
+          <a:xfrm>
+            <a:off x="4471566" y="1155473"/>
+            <a:ext cx="800220" cy="646331"/>
+          </a:xfrm>
+          <a:prstGeom prst="rect">
+            <a:avLst/>
+          </a:prstGeom>
+          <a:solidFill>
+            <a:schemeClr val="bg1"/>
+          </a:solidFill>
+        </p:spPr>
+        <p:txBody>
+          <a:bodyPr wrap="none" rtlCol="0">
+            <a:spAutoFit/>
+          </a:bodyPr>
+          <a:lstStyle/>
+          <a:p>
+            <a:pPr algn="ctr"/>
+            <a:r>
+              <a:rPr lang="en-GB" dirty="0" smtClean="0"/>
+              <a:t>CD19+</a:t>
+            </a:r>
+          </a:p>
+          <a:p>
+            <a:pPr algn="ctr"/>
+            <a:r>
+              <a:rPr lang="en-GB" dirty="0" smtClean="0"/>
+              <a:t>3.48%</a:t>
+            </a:r>
+            <a:endParaRPr lang="en-GB" dirty="0"/>
+          </a:p>
+        </p:txBody>
+      </p:sp>
+      <p:sp>
+        <p:nvSpPr>
+          <p:cNvPr id="13" name="TextBox 12"/>
+          <p:cNvSpPr txBox="1"/>
+          <p:nvPr/>
+        </p:nvSpPr>
+        <p:spPr>
+          <a:xfrm rot="16200000">
+            <a:off x="2809404" y="1840947"/>
+            <a:ext cx="2176216" cy="461665"/>
+          </a:xfrm>
+          <a:prstGeom prst="rect">
+            <a:avLst/>
+          </a:prstGeom>
+          <a:solidFill>
+            <a:schemeClr val="bg1"/>
+          </a:solidFill>
+        </p:spPr>
+        <p:txBody>
+          <a:bodyPr wrap="square" rtlCol="0">
+            <a:spAutoFit/>
+          </a:bodyPr>
+          <a:lstStyle/>
+          <a:p>
+            <a:r>
+              <a:rPr lang="en-GB" sz="2400" dirty="0" smtClean="0"/>
+              <a:t>CD19</a:t>
+            </a:r>
+            <a:endParaRPr lang="en-GB" sz="2400" dirty="0"/>
+          </a:p>
+        </p:txBody>
+      </p:sp>
+      <p:sp>
+        <p:nvSpPr>
+          <p:cNvPr id="14" name="TextBox 13"/>
+          <p:cNvSpPr txBox="1"/>
+          <p:nvPr/>
+        </p:nvSpPr>
+        <p:spPr>
+          <a:xfrm>
+            <a:off x="4411290" y="3344486"/>
+            <a:ext cx="1652697" cy="461665"/>
+          </a:xfrm>
+          <a:prstGeom prst="rect">
+            <a:avLst/>
+          </a:prstGeom>
+          <a:solidFill>
+            <a:schemeClr val="bg1"/>
+          </a:solidFill>
+        </p:spPr>
+        <p:txBody>
+          <a:bodyPr wrap="none" rtlCol="0">
+            <a:spAutoFit/>
+          </a:bodyPr>
+          <a:lstStyle/>
+          <a:p>
+            <a:r>
+              <a:rPr lang="en-GB" sz="2400" dirty="0" smtClean="0"/>
+              <a:t>Side Scatter</a:t>
+            </a:r>
+            <a:endParaRPr lang="en-GB" sz="2400" dirty="0"/>
+          </a:p>
+        </p:txBody>
+      </p:sp>
+      <p:sp>
+        <p:nvSpPr>
+          <p:cNvPr id="15" name="TextBox 14"/>
+          <p:cNvSpPr txBox="1"/>
+          <p:nvPr/>
+        </p:nvSpPr>
+        <p:spPr>
+          <a:xfrm>
+            <a:off x="1638992" y="182255"/>
+            <a:ext cx="426720" cy="369332"/>
+          </a:xfrm>
+          <a:prstGeom prst="rect">
+            <a:avLst/>
+          </a:prstGeom>
+          <a:noFill/>
+        </p:spPr>
+        <p:txBody>
+          <a:bodyPr wrap="none" rtlCol="0">
+            <a:spAutoFit/>
+          </a:bodyPr>
+          <a:lstStyle/>
+          <a:p>
+            <a:r>
+              <a:rPr lang="en-GB" dirty="0" smtClean="0"/>
+              <a:t>B6</a:t>
+            </a:r>
+            <a:endParaRPr lang="en-GB" dirty="0"/>
+          </a:p>
+        </p:txBody>
+      </p:sp>
+      <p:sp>
+        <p:nvSpPr>
+          <p:cNvPr id="16" name="TextBox 15"/>
+          <p:cNvSpPr txBox="1"/>
+          <p:nvPr/>
+        </p:nvSpPr>
+        <p:spPr>
+          <a:xfrm>
+            <a:off x="4863981" y="182255"/>
+            <a:ext cx="998991" cy="369332"/>
+          </a:xfrm>
+          <a:prstGeom prst="rect">
+            <a:avLst/>
+          </a:prstGeom>
+          <a:noFill/>
+        </p:spPr>
+        <p:txBody>
+          <a:bodyPr wrap="none" rtlCol="0">
+            <a:spAutoFit/>
+          </a:bodyPr>
+          <a:lstStyle/>
+          <a:p>
+            <a:r>
+              <a:rPr lang="en-GB" dirty="0" smtClean="0"/>
+              <a:t>NOD WT</a:t>
+            </a:r>
+            <a:endParaRPr lang="en-GB" dirty="0"/>
+          </a:p>
+        </p:txBody>
+      </p:sp>
+      <p:sp>
+        <p:nvSpPr>
+          <p:cNvPr id="17" name="TextBox 16"/>
+          <p:cNvSpPr txBox="1"/>
+          <p:nvPr/>
+        </p:nvSpPr>
+        <p:spPr>
+          <a:xfrm>
+            <a:off x="8403029" y="176889"/>
+            <a:ext cx="943143" cy="369332"/>
+          </a:xfrm>
+          <a:prstGeom prst="rect">
+            <a:avLst/>
+          </a:prstGeom>
+          <a:noFill/>
+        </p:spPr>
+        <p:txBody>
+          <a:bodyPr wrap="none" rtlCol="0">
+            <a:spAutoFit/>
+          </a:bodyPr>
+          <a:lstStyle/>
+          <a:p>
+            <a:r>
+              <a:rPr lang="en-GB" dirty="0" smtClean="0"/>
+              <a:t>NOD KO</a:t>
+            </a:r>
+            <a:endParaRPr lang="en-GB" dirty="0"/>
+          </a:p>
+        </p:txBody>
+      </p:sp>
+    </p:spTree>
+    <p:extLst>
+      <p:ext uri="{BB962C8B-B14F-4D97-AF65-F5344CB8AC3E}">
+        <p14:creationId xmlns:p14="http://schemas.microsoft.com/office/powerpoint/2010/main" val="724265835"/>
       </p:ext>
     </p:extLst>
   </p:cSld>

</xml_diff>

<commit_message>
Did more on Data Collection and started Background.
</commit_message>
<xml_diff>
--- a/Figures/Powerpoints/3 plots.pptx
+++ b/Figures/Powerpoints/3 plots.pptx
@@ -5,7 +5,7 @@
     <p:sldMasterId id="2147483672" r:id="rId1"/>
   </p:sldMasterIdLst>
   <p:notesMasterIdLst>
-    <p:notesMasterId r:id="rId17"/>
+    <p:notesMasterId r:id="rId20"/>
   </p:notesMasterIdLst>
   <p:sldIdLst>
     <p:sldId id="256" r:id="rId2"/>
@@ -23,6 +23,9 @@
     <p:sldId id="270" r:id="rId14"/>
     <p:sldId id="271" r:id="rId15"/>
     <p:sldId id="272" r:id="rId16"/>
+    <p:sldId id="273" r:id="rId17"/>
+    <p:sldId id="274" r:id="rId18"/>
+    <p:sldId id="275" r:id="rId19"/>
   </p:sldIdLst>
   <p:sldSz cx="10799763" cy="3959225"/>
   <p:notesSz cx="6858000" cy="9144000"/>
@@ -211,7 +214,7 @@
           <a:p>
             <a:fld id="{32F7D83B-ADDA-4ECB-B692-7302BE334C8B}" type="datetimeFigureOut">
               <a:rPr lang="en-GB" smtClean="0"/>
-              <a:t>07/08/2015</a:t>
+              <a:t>08/08/2015</a:t>
             </a:fld>
             <a:endParaRPr lang="en-GB"/>
           </a:p>
@@ -875,6 +878,282 @@
 </p:notes>
 </file>
 
+<file path=ppt/notesSlides/notesSlide13.xml><?xml version="1.0" encoding="utf-8"?>
+<p:notes xmlns:a="http://schemas.openxmlformats.org/drawingml/2006/main" xmlns:r="http://schemas.openxmlformats.org/officeDocument/2006/relationships" xmlns:p="http://schemas.openxmlformats.org/presentationml/2006/main">
+  <p:cSld>
+    <p:spTree>
+      <p:nvGrpSpPr>
+        <p:cNvPr id="1" name=""/>
+        <p:cNvGrpSpPr/>
+        <p:nvPr/>
+      </p:nvGrpSpPr>
+      <p:grpSpPr>
+        <a:xfrm>
+          <a:off x="0" y="0"/>
+          <a:ext cx="0" cy="0"/>
+          <a:chOff x="0" y="0"/>
+          <a:chExt cx="0" cy="0"/>
+        </a:xfrm>
+      </p:grpSpPr>
+      <p:sp>
+        <p:nvSpPr>
+          <p:cNvPr id="2" name="Slide Image Placeholder 1"/>
+          <p:cNvSpPr>
+            <a:spLocks noGrp="1" noRot="1" noChangeAspect="1"/>
+          </p:cNvSpPr>
+          <p:nvPr>
+            <p:ph type="sldImg"/>
+          </p:nvPr>
+        </p:nvSpPr>
+        <p:spPr/>
+      </p:sp>
+      <p:sp>
+        <p:nvSpPr>
+          <p:cNvPr id="3" name="Notes Placeholder 2"/>
+          <p:cNvSpPr>
+            <a:spLocks noGrp="1"/>
+          </p:cNvSpPr>
+          <p:nvPr>
+            <p:ph type="body" idx="1"/>
+          </p:nvPr>
+        </p:nvSpPr>
+        <p:spPr/>
+        <p:txBody>
+          <a:bodyPr/>
+          <a:lstStyle/>
+          <a:p>
+            <a:r>
+              <a:rPr lang="en-GB" dirty="0" smtClean="0"/>
+              <a:t>GFP </a:t>
+            </a:r>
+            <a:r>
+              <a:rPr lang="en-GB" dirty="0" smtClean="0">
+                <a:sym typeface="Wingdings" panose="05000000000000000000" pitchFamily="2" charset="2"/>
+              </a:rPr>
+              <a:t></a:t>
+            </a:r>
+            <a:r>
+              <a:rPr lang="en-GB" dirty="0" smtClean="0"/>
+              <a:t> WT</a:t>
+            </a:r>
+            <a:endParaRPr lang="en-GB" dirty="0"/>
+          </a:p>
+        </p:txBody>
+      </p:sp>
+      <p:sp>
+        <p:nvSpPr>
+          <p:cNvPr id="4" name="Slide Number Placeholder 3"/>
+          <p:cNvSpPr>
+            <a:spLocks noGrp="1"/>
+          </p:cNvSpPr>
+          <p:nvPr>
+            <p:ph type="sldNum" sz="quarter" idx="10"/>
+          </p:nvPr>
+        </p:nvSpPr>
+        <p:spPr/>
+        <p:txBody>
+          <a:bodyPr/>
+          <a:lstStyle/>
+          <a:p>
+            <a:fld id="{F9FE1E78-BF79-4B81-BC92-5B601D8D92F9}" type="slidenum">
+              <a:rPr lang="en-GB" smtClean="0"/>
+              <a:t>16</a:t>
+            </a:fld>
+            <a:endParaRPr lang="en-GB"/>
+          </a:p>
+        </p:txBody>
+      </p:sp>
+    </p:spTree>
+    <p:extLst>
+      <p:ext uri="{BB962C8B-B14F-4D97-AF65-F5344CB8AC3E}">
+        <p14:creationId xmlns:p14="http://schemas.microsoft.com/office/powerpoint/2010/main" val="1154455101"/>
+      </p:ext>
+    </p:extLst>
+  </p:cSld>
+  <p:clrMapOvr>
+    <a:masterClrMapping/>
+  </p:clrMapOvr>
+</p:notes>
+</file>
+
+<file path=ppt/notesSlides/notesSlide14.xml><?xml version="1.0" encoding="utf-8"?>
+<p:notes xmlns:a="http://schemas.openxmlformats.org/drawingml/2006/main" xmlns:r="http://schemas.openxmlformats.org/officeDocument/2006/relationships" xmlns:p="http://schemas.openxmlformats.org/presentationml/2006/main">
+  <p:cSld>
+    <p:spTree>
+      <p:nvGrpSpPr>
+        <p:cNvPr id="1" name=""/>
+        <p:cNvGrpSpPr/>
+        <p:nvPr/>
+      </p:nvGrpSpPr>
+      <p:grpSpPr>
+        <a:xfrm>
+          <a:off x="0" y="0"/>
+          <a:ext cx="0" cy="0"/>
+          <a:chOff x="0" y="0"/>
+          <a:chExt cx="0" cy="0"/>
+        </a:xfrm>
+      </p:grpSpPr>
+      <p:sp>
+        <p:nvSpPr>
+          <p:cNvPr id="2" name="Slide Image Placeholder 1"/>
+          <p:cNvSpPr>
+            <a:spLocks noGrp="1" noRot="1" noChangeAspect="1"/>
+          </p:cNvSpPr>
+          <p:nvPr>
+            <p:ph type="sldImg"/>
+          </p:nvPr>
+        </p:nvSpPr>
+        <p:spPr/>
+      </p:sp>
+      <p:sp>
+        <p:nvSpPr>
+          <p:cNvPr id="3" name="Notes Placeholder 2"/>
+          <p:cNvSpPr>
+            <a:spLocks noGrp="1"/>
+          </p:cNvSpPr>
+          <p:nvPr>
+            <p:ph type="body" idx="1"/>
+          </p:nvPr>
+        </p:nvSpPr>
+        <p:spPr/>
+        <p:txBody>
+          <a:bodyPr/>
+          <a:lstStyle/>
+          <a:p>
+            <a:r>
+              <a:rPr lang="en-GB" dirty="0" smtClean="0"/>
+              <a:t>NOD </a:t>
+            </a:r>
+            <a:r>
+              <a:rPr lang="en-GB" dirty="0" smtClean="0">
+                <a:sym typeface="Wingdings" panose="05000000000000000000" pitchFamily="2" charset="2"/>
+              </a:rPr>
+              <a:t> KO</a:t>
+            </a:r>
+            <a:endParaRPr lang="en-GB" dirty="0"/>
+          </a:p>
+        </p:txBody>
+      </p:sp>
+      <p:sp>
+        <p:nvSpPr>
+          <p:cNvPr id="4" name="Slide Number Placeholder 3"/>
+          <p:cNvSpPr>
+            <a:spLocks noGrp="1"/>
+          </p:cNvSpPr>
+          <p:nvPr>
+            <p:ph type="sldNum" sz="quarter" idx="10"/>
+          </p:nvPr>
+        </p:nvSpPr>
+        <p:spPr/>
+        <p:txBody>
+          <a:bodyPr/>
+          <a:lstStyle/>
+          <a:p>
+            <a:fld id="{F9FE1E78-BF79-4B81-BC92-5B601D8D92F9}" type="slidenum">
+              <a:rPr lang="en-GB" smtClean="0"/>
+              <a:t>17</a:t>
+            </a:fld>
+            <a:endParaRPr lang="en-GB"/>
+          </a:p>
+        </p:txBody>
+      </p:sp>
+    </p:spTree>
+    <p:extLst>
+      <p:ext uri="{BB962C8B-B14F-4D97-AF65-F5344CB8AC3E}">
+        <p14:creationId xmlns:p14="http://schemas.microsoft.com/office/powerpoint/2010/main" val="924632535"/>
+      </p:ext>
+    </p:extLst>
+  </p:cSld>
+  <p:clrMapOvr>
+    <a:masterClrMapping/>
+  </p:clrMapOvr>
+</p:notes>
+</file>
+
+<file path=ppt/notesSlides/notesSlide15.xml><?xml version="1.0" encoding="utf-8"?>
+<p:notes xmlns:a="http://schemas.openxmlformats.org/drawingml/2006/main" xmlns:r="http://schemas.openxmlformats.org/officeDocument/2006/relationships" xmlns:p="http://schemas.openxmlformats.org/presentationml/2006/main">
+  <p:cSld>
+    <p:spTree>
+      <p:nvGrpSpPr>
+        <p:cNvPr id="1" name=""/>
+        <p:cNvGrpSpPr/>
+        <p:nvPr/>
+      </p:nvGrpSpPr>
+      <p:grpSpPr>
+        <a:xfrm>
+          <a:off x="0" y="0"/>
+          <a:ext cx="0" cy="0"/>
+          <a:chOff x="0" y="0"/>
+          <a:chExt cx="0" cy="0"/>
+        </a:xfrm>
+      </p:grpSpPr>
+      <p:sp>
+        <p:nvSpPr>
+          <p:cNvPr id="2" name="Slide Image Placeholder 1"/>
+          <p:cNvSpPr>
+            <a:spLocks noGrp="1" noRot="1" noChangeAspect="1"/>
+          </p:cNvSpPr>
+          <p:nvPr>
+            <p:ph type="sldImg"/>
+          </p:nvPr>
+        </p:nvSpPr>
+        <p:spPr/>
+      </p:sp>
+      <p:sp>
+        <p:nvSpPr>
+          <p:cNvPr id="3" name="Notes Placeholder 2"/>
+          <p:cNvSpPr>
+            <a:spLocks noGrp="1"/>
+          </p:cNvSpPr>
+          <p:nvPr>
+            <p:ph type="body" idx="1"/>
+          </p:nvPr>
+        </p:nvSpPr>
+        <p:spPr/>
+        <p:txBody>
+          <a:bodyPr/>
+          <a:lstStyle/>
+          <a:p>
+            <a:endParaRPr lang="en-GB" dirty="0"/>
+          </a:p>
+        </p:txBody>
+      </p:sp>
+      <p:sp>
+        <p:nvSpPr>
+          <p:cNvPr id="4" name="Slide Number Placeholder 3"/>
+          <p:cNvSpPr>
+            <a:spLocks noGrp="1"/>
+          </p:cNvSpPr>
+          <p:nvPr>
+            <p:ph type="sldNum" sz="quarter" idx="10"/>
+          </p:nvPr>
+        </p:nvSpPr>
+        <p:spPr/>
+        <p:txBody>
+          <a:bodyPr/>
+          <a:lstStyle/>
+          <a:p>
+            <a:fld id="{F9FE1E78-BF79-4B81-BC92-5B601D8D92F9}" type="slidenum">
+              <a:rPr lang="en-GB" smtClean="0"/>
+              <a:t>18</a:t>
+            </a:fld>
+            <a:endParaRPr lang="en-GB"/>
+          </a:p>
+        </p:txBody>
+      </p:sp>
+    </p:spTree>
+    <p:extLst>
+      <p:ext uri="{BB962C8B-B14F-4D97-AF65-F5344CB8AC3E}">
+        <p14:creationId xmlns:p14="http://schemas.microsoft.com/office/powerpoint/2010/main" val="2481961933"/>
+      </p:ext>
+    </p:extLst>
+  </p:cSld>
+  <p:clrMapOvr>
+    <a:masterClrMapping/>
+  </p:clrMapOvr>
+</p:notes>
+</file>
+
 <file path=ppt/notesSlides/notesSlide2.xml><?xml version="1.0" encoding="utf-8"?>
 <p:notes xmlns:a="http://schemas.openxmlformats.org/drawingml/2006/main" xmlns:r="http://schemas.openxmlformats.org/officeDocument/2006/relationships" xmlns:p="http://schemas.openxmlformats.org/presentationml/2006/main">
   <p:cSld>
@@ -1747,7 +2026,7 @@
           <a:p>
             <a:fld id="{5FFCCEB8-80C3-44AA-83D7-DF78E6311A10}" type="datetimeFigureOut">
               <a:rPr lang="en-GB" smtClean="0"/>
-              <a:t>07/08/2015</a:t>
+              <a:t>08/08/2015</a:t>
             </a:fld>
             <a:endParaRPr lang="en-GB"/>
           </a:p>
@@ -1917,7 +2196,7 @@
           <a:p>
             <a:fld id="{5FFCCEB8-80C3-44AA-83D7-DF78E6311A10}" type="datetimeFigureOut">
               <a:rPr lang="en-GB" smtClean="0"/>
-              <a:t>07/08/2015</a:t>
+              <a:t>08/08/2015</a:t>
             </a:fld>
             <a:endParaRPr lang="en-GB"/>
           </a:p>
@@ -2097,7 +2376,7 @@
           <a:p>
             <a:fld id="{5FFCCEB8-80C3-44AA-83D7-DF78E6311A10}" type="datetimeFigureOut">
               <a:rPr lang="en-GB" smtClean="0"/>
-              <a:t>07/08/2015</a:t>
+              <a:t>08/08/2015</a:t>
             </a:fld>
             <a:endParaRPr lang="en-GB"/>
           </a:p>
@@ -2267,7 +2546,7 @@
           <a:p>
             <a:fld id="{5FFCCEB8-80C3-44AA-83D7-DF78E6311A10}" type="datetimeFigureOut">
               <a:rPr lang="en-GB" smtClean="0"/>
-              <a:t>07/08/2015</a:t>
+              <a:t>08/08/2015</a:t>
             </a:fld>
             <a:endParaRPr lang="en-GB"/>
           </a:p>
@@ -2513,7 +2792,7 @@
           <a:p>
             <a:fld id="{5FFCCEB8-80C3-44AA-83D7-DF78E6311A10}" type="datetimeFigureOut">
               <a:rPr lang="en-GB" smtClean="0"/>
-              <a:t>07/08/2015</a:t>
+              <a:t>08/08/2015</a:t>
             </a:fld>
             <a:endParaRPr lang="en-GB"/>
           </a:p>
@@ -2745,7 +3024,7 @@
           <a:p>
             <a:fld id="{5FFCCEB8-80C3-44AA-83D7-DF78E6311A10}" type="datetimeFigureOut">
               <a:rPr lang="en-GB" smtClean="0"/>
-              <a:t>07/08/2015</a:t>
+              <a:t>08/08/2015</a:t>
             </a:fld>
             <a:endParaRPr lang="en-GB"/>
           </a:p>
@@ -3112,7 +3391,7 @@
           <a:p>
             <a:fld id="{5FFCCEB8-80C3-44AA-83D7-DF78E6311A10}" type="datetimeFigureOut">
               <a:rPr lang="en-GB" smtClean="0"/>
-              <a:t>07/08/2015</a:t>
+              <a:t>08/08/2015</a:t>
             </a:fld>
             <a:endParaRPr lang="en-GB"/>
           </a:p>
@@ -3230,7 +3509,7 @@
           <a:p>
             <a:fld id="{5FFCCEB8-80C3-44AA-83D7-DF78E6311A10}" type="datetimeFigureOut">
               <a:rPr lang="en-GB" smtClean="0"/>
-              <a:t>07/08/2015</a:t>
+              <a:t>08/08/2015</a:t>
             </a:fld>
             <a:endParaRPr lang="en-GB"/>
           </a:p>
@@ -3325,7 +3604,7 @@
           <a:p>
             <a:fld id="{5FFCCEB8-80C3-44AA-83D7-DF78E6311A10}" type="datetimeFigureOut">
               <a:rPr lang="en-GB" smtClean="0"/>
-              <a:t>07/08/2015</a:t>
+              <a:t>08/08/2015</a:t>
             </a:fld>
             <a:endParaRPr lang="en-GB"/>
           </a:p>
@@ -3602,7 +3881,7 @@
           <a:p>
             <a:fld id="{5FFCCEB8-80C3-44AA-83D7-DF78E6311A10}" type="datetimeFigureOut">
               <a:rPr lang="en-GB" smtClean="0"/>
-              <a:t>07/08/2015</a:t>
+              <a:t>08/08/2015</a:t>
             </a:fld>
             <a:endParaRPr lang="en-GB"/>
           </a:p>
@@ -3859,7 +4138,7 @@
           <a:p>
             <a:fld id="{5FFCCEB8-80C3-44AA-83D7-DF78E6311A10}" type="datetimeFigureOut">
               <a:rPr lang="en-GB" smtClean="0"/>
-              <a:t>07/08/2015</a:t>
+              <a:t>08/08/2015</a:t>
             </a:fld>
             <a:endParaRPr lang="en-GB"/>
           </a:p>
@@ -4072,7 +4351,7 @@
           <a:p>
             <a:fld id="{5FFCCEB8-80C3-44AA-83D7-DF78E6311A10}" type="datetimeFigureOut">
               <a:rPr lang="en-GB" smtClean="0"/>
-              <a:t>07/08/2015</a:t>
+              <a:t>08/08/2015</a:t>
             </a:fld>
             <a:endParaRPr lang="en-GB"/>
           </a:p>
@@ -7158,11 +7437,7 @@
             <a:pPr algn="ctr"/>
             <a:r>
               <a:rPr lang="en-GB" dirty="0" smtClean="0"/>
-              <a:t>72.0</a:t>
-            </a:r>
-            <a:r>
-              <a:rPr lang="en-GB" dirty="0" smtClean="0"/>
-              <a:t>%</a:t>
+              <a:t>72.0%</a:t>
             </a:r>
             <a:endParaRPr lang="en-GB" dirty="0"/>
           </a:p>
@@ -7221,17 +7496,12 @@
               <a:rPr lang="en-GB" dirty="0" smtClean="0"/>
               <a:t>CD19+</a:t>
             </a:r>
-            <a:endParaRPr lang="en-GB" dirty="0" smtClean="0"/>
           </a:p>
           <a:p>
             <a:pPr algn="ctr"/>
             <a:r>
               <a:rPr lang="en-GB" dirty="0" smtClean="0"/>
-              <a:t>5.06</a:t>
-            </a:r>
-            <a:r>
-              <a:rPr lang="en-GB" dirty="0" smtClean="0"/>
-              <a:t>%</a:t>
+              <a:t>5.06%</a:t>
             </a:r>
             <a:endParaRPr lang="en-GB" dirty="0"/>
           </a:p>
@@ -7288,23 +7558,14 @@
             <a:pPr algn="ctr"/>
             <a:r>
               <a:rPr lang="en-GB" dirty="0" smtClean="0"/>
-              <a:t>RAG</a:t>
-            </a:r>
+              <a:t>RAG+</a:t>
+            </a:r>
+          </a:p>
+          <a:p>
+            <a:pPr algn="ctr"/>
             <a:r>
               <a:rPr lang="en-GB" dirty="0" smtClean="0"/>
-              <a:t>+</a:t>
-            </a:r>
-            <a:endParaRPr lang="en-GB" dirty="0" smtClean="0"/>
-          </a:p>
-          <a:p>
-            <a:pPr algn="ctr"/>
-            <a:r>
-              <a:rPr lang="en-GB" dirty="0" smtClean="0"/>
-              <a:t>39.1</a:t>
-            </a:r>
-            <a:r>
-              <a:rPr lang="en-GB" dirty="0" smtClean="0"/>
-              <a:t>%</a:t>
+              <a:t>39.1%</a:t>
             </a:r>
             <a:endParaRPr lang="en-GB" dirty="0"/>
           </a:p>
@@ -7736,7 +7997,6 @@
               <a:rPr lang="en-GB" dirty="0" smtClean="0"/>
               <a:t>CD19+</a:t>
             </a:r>
-            <a:endParaRPr lang="en-GB" dirty="0" smtClean="0"/>
           </a:p>
           <a:p>
             <a:pPr algn="ctr"/>
@@ -7775,13 +8035,8 @@
             <a:pPr algn="ctr"/>
             <a:r>
               <a:rPr lang="en-GB" dirty="0" smtClean="0"/>
-              <a:t>RAG</a:t>
-            </a:r>
-            <a:r>
-              <a:rPr lang="en-GB" dirty="0" smtClean="0"/>
-              <a:t>+</a:t>
-            </a:r>
-            <a:endParaRPr lang="en-GB" dirty="0" smtClean="0"/>
+              <a:t>RAG+</a:t>
+            </a:r>
           </a:p>
           <a:p>
             <a:pPr algn="ctr"/>
@@ -8061,6 +8316,904 @@
     <p:extLst>
       <p:ext uri="{BB962C8B-B14F-4D97-AF65-F5344CB8AC3E}">
         <p14:creationId xmlns:p14="http://schemas.microsoft.com/office/powerpoint/2010/main" val="704057349"/>
+      </p:ext>
+    </p:extLst>
+  </p:cSld>
+  <p:clrMapOvr>
+    <a:masterClrMapping/>
+  </p:clrMapOvr>
+</p:sld>
+</file>
+
+<file path=ppt/slides/slide16.xml><?xml version="1.0" encoding="utf-8"?>
+<p:sld xmlns:a="http://schemas.openxmlformats.org/drawingml/2006/main" xmlns:r="http://schemas.openxmlformats.org/officeDocument/2006/relationships" xmlns:p="http://schemas.openxmlformats.org/presentationml/2006/main">
+  <p:cSld>
+    <p:spTree>
+      <p:nvGrpSpPr>
+        <p:cNvPr id="1" name=""/>
+        <p:cNvGrpSpPr/>
+        <p:nvPr/>
+      </p:nvGrpSpPr>
+      <p:grpSpPr>
+        <a:xfrm>
+          <a:off x="0" y="0"/>
+          <a:ext cx="0" cy="0"/>
+          <a:chOff x="0" y="0"/>
+          <a:chExt cx="0" cy="0"/>
+        </a:xfrm>
+      </p:grpSpPr>
+      <p:graphicFrame>
+        <p:nvGraphicFramePr>
+          <p:cNvPr id="2" name="Table 1"/>
+          <p:cNvGraphicFramePr>
+            <a:graphicFrameLocks noGrp="1"/>
+          </p:cNvGraphicFramePr>
+          <p:nvPr>
+            <p:extLst>
+              <p:ext uri="{D42A27DB-BD31-4B8C-83A1-F6EECF244321}">
+                <p14:modId xmlns:p14="http://schemas.microsoft.com/office/powerpoint/2010/main" val="3629064132"/>
+              </p:ext>
+            </p:extLst>
+          </p:nvPr>
+        </p:nvGraphicFramePr>
+        <p:xfrm>
+          <a:off x="199512" y="1099784"/>
+          <a:ext cx="10415840" cy="1842922"/>
+        </p:xfrm>
+        <a:graphic>
+          <a:graphicData uri="http://schemas.openxmlformats.org/drawingml/2006/table">
+            <a:tbl>
+              <a:tblPr firstRow="1" bandRow="1">
+                <a:tableStyleId>{5C22544A-7EE6-4342-B048-85BDC9FD1C3A}</a:tableStyleId>
+              </a:tblPr>
+              <a:tblGrid>
+                <a:gridCol w="1041584"/>
+                <a:gridCol w="1041584"/>
+                <a:gridCol w="1041584"/>
+                <a:gridCol w="1041584"/>
+                <a:gridCol w="1041584"/>
+                <a:gridCol w="1041584"/>
+                <a:gridCol w="1041584"/>
+                <a:gridCol w="1041584"/>
+                <a:gridCol w="1041584"/>
+                <a:gridCol w="1041584"/>
+              </a:tblGrid>
+              <a:tr h="1017564">
+                <a:tc>
+                  <a:txBody>
+                    <a:bodyPr/>
+                    <a:lstStyle/>
+                    <a:p>
+                      <a:r>
+                        <a:rPr lang="en-GB" sz="1400" dirty="0" smtClean="0"/>
+                        <a:t>Fraction</a:t>
+                      </a:r>
+                      <a:endParaRPr lang="en-GB" sz="1400" dirty="0"/>
+                    </a:p>
+                  </a:txBody>
+                  <a:tcPr/>
+                </a:tc>
+                <a:tc>
+                  <a:txBody>
+                    <a:bodyPr/>
+                    <a:lstStyle/>
+                    <a:p>
+                      <a:r>
+                        <a:rPr lang="en-GB" sz="1400" dirty="0" smtClean="0"/>
+                        <a:t>Number</a:t>
+                      </a:r>
+                      <a:r>
+                        <a:rPr lang="en-GB" sz="1400" baseline="0" dirty="0" smtClean="0"/>
+                        <a:t> of Cells</a:t>
+                      </a:r>
+                      <a:endParaRPr lang="en-GB" sz="1400" dirty="0"/>
+                    </a:p>
+                  </a:txBody>
+                  <a:tcPr/>
+                </a:tc>
+                <a:tc>
+                  <a:txBody>
+                    <a:bodyPr/>
+                    <a:lstStyle/>
+                    <a:p>
+                      <a:r>
+                        <a:rPr lang="en-GB" sz="1400" dirty="0" smtClean="0"/>
+                        <a:t>%</a:t>
+                      </a:r>
+                      <a:r>
+                        <a:rPr lang="en-GB" sz="1400" baseline="0" dirty="0" smtClean="0"/>
+                        <a:t> B220+</a:t>
+                      </a:r>
+                      <a:endParaRPr lang="en-GB" sz="1400" dirty="0"/>
+                    </a:p>
+                  </a:txBody>
+                  <a:tcPr/>
+                </a:tc>
+                <a:tc>
+                  <a:txBody>
+                    <a:bodyPr/>
+                    <a:lstStyle/>
+                    <a:p>
+                      <a:r>
+                        <a:rPr lang="en-GB" sz="1400" dirty="0" smtClean="0"/>
+                        <a:t>% GFP+ of B220+</a:t>
+                      </a:r>
+                      <a:endParaRPr lang="en-GB" sz="1400" dirty="0"/>
+                    </a:p>
+                  </a:txBody>
+                  <a:tcPr/>
+                </a:tc>
+                <a:tc>
+                  <a:txBody>
+                    <a:bodyPr/>
+                    <a:lstStyle/>
+                    <a:p>
+                      <a:r>
+                        <a:rPr lang="en-GB" sz="1400" dirty="0" smtClean="0"/>
+                        <a:t>Number</a:t>
+                      </a:r>
+                      <a:r>
+                        <a:rPr lang="en-GB" sz="1400" baseline="0" dirty="0" smtClean="0"/>
+                        <a:t> B220+</a:t>
+                      </a:r>
+                      <a:endParaRPr lang="en-GB" sz="1400" dirty="0"/>
+                    </a:p>
+                  </a:txBody>
+                  <a:tcPr/>
+                </a:tc>
+                <a:tc>
+                  <a:txBody>
+                    <a:bodyPr/>
+                    <a:lstStyle/>
+                    <a:p>
+                      <a:r>
+                        <a:rPr lang="en-GB" sz="1400" dirty="0" smtClean="0"/>
+                        <a:t>Number of B220+</a:t>
+                      </a:r>
+                      <a:r>
+                        <a:rPr lang="en-GB" sz="1400" baseline="0" dirty="0" smtClean="0"/>
+                        <a:t> GFP</a:t>
+                      </a:r>
+                      <a:r>
+                        <a:rPr lang="en-GB" sz="1400" dirty="0" smtClean="0"/>
+                        <a:t>+</a:t>
+                      </a:r>
+                      <a:endParaRPr lang="en-GB" sz="1400" dirty="0"/>
+                    </a:p>
+                  </a:txBody>
+                  <a:tcPr/>
+                </a:tc>
+                <a:tc>
+                  <a:txBody>
+                    <a:bodyPr/>
+                    <a:lstStyle/>
+                    <a:p>
+                      <a:r>
+                        <a:rPr lang="en-GB" sz="1400" dirty="0" smtClean="0"/>
+                        <a:t>% B220+ IgM+</a:t>
+                      </a:r>
+                      <a:endParaRPr lang="en-GB" sz="1400" dirty="0"/>
+                    </a:p>
+                  </a:txBody>
+                  <a:tcPr/>
+                </a:tc>
+                <a:tc>
+                  <a:txBody>
+                    <a:bodyPr/>
+                    <a:lstStyle/>
+                    <a:p>
+                      <a:r>
+                        <a:rPr lang="en-GB" sz="1400" baseline="0" dirty="0" smtClean="0"/>
+                        <a:t>% GFP+ of B220+ IgM+</a:t>
+                      </a:r>
+                      <a:endParaRPr lang="en-GB" sz="1400" dirty="0"/>
+                    </a:p>
+                  </a:txBody>
+                  <a:tcPr/>
+                </a:tc>
+                <a:tc>
+                  <a:txBody>
+                    <a:bodyPr/>
+                    <a:lstStyle/>
+                    <a:p>
+                      <a:r>
+                        <a:rPr lang="en-GB" sz="1400" dirty="0" smtClean="0"/>
+                        <a:t>Number B220+IgM+</a:t>
+                      </a:r>
+                      <a:endParaRPr lang="en-GB" sz="1400" dirty="0"/>
+                    </a:p>
+                  </a:txBody>
+                  <a:tcPr/>
+                </a:tc>
+                <a:tc>
+                  <a:txBody>
+                    <a:bodyPr/>
+                    <a:lstStyle/>
+                    <a:p>
+                      <a:r>
+                        <a:rPr lang="en-GB" sz="1400" dirty="0" smtClean="0"/>
+                        <a:t>Number</a:t>
+                      </a:r>
+                      <a:r>
+                        <a:rPr lang="en-GB" sz="1400" baseline="0" dirty="0" smtClean="0"/>
+                        <a:t> of B220+ IgM+ GFP+</a:t>
+                      </a:r>
+                      <a:endParaRPr lang="en-GB" sz="1400" dirty="0"/>
+                    </a:p>
+                  </a:txBody>
+                  <a:tcPr/>
+                </a:tc>
+              </a:tr>
+              <a:tr h="412679">
+                <a:tc>
+                  <a:txBody>
+                    <a:bodyPr/>
+                    <a:lstStyle/>
+                    <a:p>
+                      <a:r>
+                        <a:rPr lang="en-GB" sz="1400" dirty="0" smtClean="0"/>
+                        <a:t>CD19+</a:t>
+                      </a:r>
+                      <a:endParaRPr lang="en-GB" sz="1400" dirty="0"/>
+                    </a:p>
+                  </a:txBody>
+                  <a:tcPr/>
+                </a:tc>
+                <a:tc>
+                  <a:txBody>
+                    <a:bodyPr/>
+                    <a:lstStyle/>
+                    <a:p>
+                      <a:r>
+                        <a:rPr lang="en-GB" sz="1400" dirty="0" smtClean="0"/>
+                        <a:t>1.01 x 10</a:t>
+                      </a:r>
+                      <a:r>
+                        <a:rPr lang="en-GB" sz="1400" baseline="30000" dirty="0" smtClean="0"/>
+                        <a:t>7</a:t>
+                      </a:r>
+                      <a:endParaRPr lang="en-GB" sz="1400" dirty="0"/>
+                    </a:p>
+                  </a:txBody>
+                  <a:tcPr/>
+                </a:tc>
+                <a:tc>
+                  <a:txBody>
+                    <a:bodyPr/>
+                    <a:lstStyle/>
+                    <a:p>
+                      <a:r>
+                        <a:rPr lang="en-GB" sz="1400" dirty="0" smtClean="0"/>
+                        <a:t>5.42</a:t>
+                      </a:r>
+                      <a:endParaRPr lang="en-GB" sz="1400" dirty="0"/>
+                    </a:p>
+                  </a:txBody>
+                  <a:tcPr/>
+                </a:tc>
+                <a:tc>
+                  <a:txBody>
+                    <a:bodyPr/>
+                    <a:lstStyle/>
+                    <a:p>
+                      <a:r>
+                        <a:rPr lang="en-GB" sz="1400" dirty="0" smtClean="0"/>
+                        <a:t>24.3</a:t>
+                      </a:r>
+                      <a:endParaRPr lang="en-GB" sz="1400" dirty="0"/>
+                    </a:p>
+                  </a:txBody>
+                  <a:tcPr/>
+                </a:tc>
+                <a:tc>
+                  <a:txBody>
+                    <a:bodyPr/>
+                    <a:lstStyle/>
+                    <a:p>
+                      <a:r>
+                        <a:rPr lang="en-GB" sz="1400" dirty="0" smtClean="0"/>
+                        <a:t>434686</a:t>
+                      </a:r>
+                      <a:endParaRPr lang="en-GB" sz="1400" dirty="0"/>
+                    </a:p>
+                  </a:txBody>
+                  <a:tcPr/>
+                </a:tc>
+                <a:tc>
+                  <a:txBody>
+                    <a:bodyPr/>
+                    <a:lstStyle/>
+                    <a:p>
+                      <a:r>
+                        <a:rPr lang="en-GB" sz="1400" dirty="0" smtClean="0"/>
+                        <a:t>105629</a:t>
+                      </a:r>
+                      <a:endParaRPr lang="en-GB" sz="1400" dirty="0"/>
+                    </a:p>
+                  </a:txBody>
+                  <a:tcPr/>
+                </a:tc>
+                <a:tc>
+                  <a:txBody>
+                    <a:bodyPr/>
+                    <a:lstStyle/>
+                    <a:p>
+                      <a:r>
+                        <a:rPr lang="en-GB" sz="1400" dirty="0" smtClean="0"/>
+                        <a:t>4.78</a:t>
+                      </a:r>
+                      <a:endParaRPr lang="en-GB" sz="1400" dirty="0"/>
+                    </a:p>
+                  </a:txBody>
+                  <a:tcPr/>
+                </a:tc>
+                <a:tc>
+                  <a:txBody>
+                    <a:bodyPr/>
+                    <a:lstStyle/>
+                    <a:p>
+                      <a:r>
+                        <a:rPr lang="en-GB" sz="1400" dirty="0" smtClean="0"/>
+                        <a:t>24.6</a:t>
+                      </a:r>
+                      <a:endParaRPr lang="en-GB" sz="1400" dirty="0"/>
+                    </a:p>
+                  </a:txBody>
+                  <a:tcPr/>
+                </a:tc>
+                <a:tc>
+                  <a:txBody>
+                    <a:bodyPr/>
+                    <a:lstStyle/>
+                    <a:p>
+                      <a:r>
+                        <a:rPr lang="en-GB" sz="1400" dirty="0" smtClean="0"/>
+                        <a:t>383358</a:t>
+                      </a:r>
+                      <a:endParaRPr lang="en-GB" sz="1400" dirty="0"/>
+                    </a:p>
+                  </a:txBody>
+                  <a:tcPr/>
+                </a:tc>
+                <a:tc>
+                  <a:txBody>
+                    <a:bodyPr/>
+                    <a:lstStyle/>
+                    <a:p>
+                      <a:r>
+                        <a:rPr lang="en-GB" sz="1400" dirty="0" smtClean="0"/>
+                        <a:t>94306</a:t>
+                      </a:r>
+                      <a:endParaRPr lang="en-GB" sz="1400" dirty="0"/>
+                    </a:p>
+                  </a:txBody>
+                  <a:tcPr/>
+                </a:tc>
+              </a:tr>
+              <a:tr h="412679">
+                <a:tc>
+                  <a:txBody>
+                    <a:bodyPr/>
+                    <a:lstStyle/>
+                    <a:p>
+                      <a:r>
+                        <a:rPr lang="en-GB" sz="1400" dirty="0" smtClean="0"/>
+                        <a:t>CD19-</a:t>
+                      </a:r>
+                      <a:endParaRPr lang="en-GB" sz="1400" dirty="0"/>
+                    </a:p>
+                  </a:txBody>
+                  <a:tcPr/>
+                </a:tc>
+                <a:tc>
+                  <a:txBody>
+                    <a:bodyPr/>
+                    <a:lstStyle/>
+                    <a:p>
+                      <a:r>
+                        <a:rPr lang="en-GB" sz="1400" dirty="0" smtClean="0"/>
+                        <a:t>2.59 x 10</a:t>
+                      </a:r>
+                      <a:r>
+                        <a:rPr lang="en-GB" sz="1400" baseline="30000" dirty="0" smtClean="0"/>
+                        <a:t>7</a:t>
+                      </a:r>
+                      <a:endParaRPr lang="en-GB" sz="1400" dirty="0"/>
+                    </a:p>
+                  </a:txBody>
+                  <a:tcPr/>
+                </a:tc>
+                <a:tc>
+                  <a:txBody>
+                    <a:bodyPr/>
+                    <a:lstStyle/>
+                    <a:p>
+                      <a:r>
+                        <a:rPr lang="en-GB" sz="1400" dirty="0" smtClean="0"/>
+                        <a:t>0.161</a:t>
+                      </a:r>
+                      <a:endParaRPr lang="en-GB" sz="1400" dirty="0"/>
+                    </a:p>
+                  </a:txBody>
+                  <a:tcPr/>
+                </a:tc>
+                <a:tc>
+                  <a:txBody>
+                    <a:bodyPr/>
+                    <a:lstStyle/>
+                    <a:p>
+                      <a:r>
+                        <a:rPr lang="en-GB" sz="1400" dirty="0" smtClean="0"/>
+                        <a:t>33</a:t>
+                      </a:r>
+                      <a:endParaRPr lang="en-GB" sz="1400" dirty="0"/>
+                    </a:p>
+                  </a:txBody>
+                  <a:tcPr/>
+                </a:tc>
+                <a:tc>
+                  <a:txBody>
+                    <a:bodyPr/>
+                    <a:lstStyle/>
+                    <a:p>
+                      <a:r>
+                        <a:rPr lang="en-GB" sz="1400" dirty="0" smtClean="0"/>
+                        <a:t>34219</a:t>
+                      </a:r>
+                      <a:endParaRPr lang="en-GB" sz="1400" dirty="0"/>
+                    </a:p>
+                  </a:txBody>
+                  <a:tcPr/>
+                </a:tc>
+                <a:tc>
+                  <a:txBody>
+                    <a:bodyPr/>
+                    <a:lstStyle/>
+                    <a:p>
+                      <a:r>
+                        <a:rPr lang="en-GB" sz="1400" dirty="0" smtClean="0"/>
+                        <a:t>11292</a:t>
+                      </a:r>
+                      <a:endParaRPr lang="en-GB" sz="1400" dirty="0"/>
+                    </a:p>
+                  </a:txBody>
+                  <a:tcPr/>
+                </a:tc>
+                <a:tc>
+                  <a:txBody>
+                    <a:bodyPr/>
+                    <a:lstStyle/>
+                    <a:p>
+                      <a:r>
+                        <a:rPr lang="en-GB" sz="1400" dirty="0" smtClean="0"/>
+                        <a:t>0.002</a:t>
+                      </a:r>
+                      <a:endParaRPr lang="en-GB" sz="1400" dirty="0"/>
+                    </a:p>
+                  </a:txBody>
+                  <a:tcPr/>
+                </a:tc>
+                <a:tc>
+                  <a:txBody>
+                    <a:bodyPr/>
+                    <a:lstStyle/>
+                    <a:p>
+                      <a:r>
+                        <a:rPr lang="en-GB" sz="1400" dirty="0" smtClean="0"/>
+                        <a:t>0</a:t>
+                      </a:r>
+                      <a:endParaRPr lang="en-GB" sz="1400" dirty="0"/>
+                    </a:p>
+                  </a:txBody>
+                  <a:tcPr/>
+                </a:tc>
+                <a:tc>
+                  <a:txBody>
+                    <a:bodyPr/>
+                    <a:lstStyle/>
+                    <a:p>
+                      <a:r>
+                        <a:rPr lang="en-GB" sz="1400" dirty="0" smtClean="0"/>
+                        <a:t>425</a:t>
+                      </a:r>
+                      <a:endParaRPr lang="en-GB" sz="1400" dirty="0"/>
+                    </a:p>
+                  </a:txBody>
+                  <a:tcPr/>
+                </a:tc>
+                <a:tc>
+                  <a:txBody>
+                    <a:bodyPr/>
+                    <a:lstStyle/>
+                    <a:p>
+                      <a:r>
+                        <a:rPr lang="en-GB" sz="1400" dirty="0" smtClean="0"/>
+                        <a:t>0</a:t>
+                      </a:r>
+                      <a:endParaRPr lang="en-GB" sz="1400" dirty="0"/>
+                    </a:p>
+                  </a:txBody>
+                  <a:tcPr/>
+                </a:tc>
+              </a:tr>
+            </a:tbl>
+          </a:graphicData>
+        </a:graphic>
+      </p:graphicFrame>
+    </p:spTree>
+    <p:extLst>
+      <p:ext uri="{BB962C8B-B14F-4D97-AF65-F5344CB8AC3E}">
+        <p14:creationId xmlns:p14="http://schemas.microsoft.com/office/powerpoint/2010/main" val="708740347"/>
+      </p:ext>
+    </p:extLst>
+  </p:cSld>
+  <p:clrMapOvr>
+    <a:masterClrMapping/>
+  </p:clrMapOvr>
+</p:sld>
+</file>
+
+<file path=ppt/slides/slide17.xml><?xml version="1.0" encoding="utf-8"?>
+<p:sld xmlns:a="http://schemas.openxmlformats.org/drawingml/2006/main" xmlns:r="http://schemas.openxmlformats.org/officeDocument/2006/relationships" xmlns:p="http://schemas.openxmlformats.org/presentationml/2006/main">
+  <p:cSld>
+    <p:spTree>
+      <p:nvGrpSpPr>
+        <p:cNvPr id="1" name=""/>
+        <p:cNvGrpSpPr/>
+        <p:nvPr/>
+      </p:nvGrpSpPr>
+      <p:grpSpPr>
+        <a:xfrm>
+          <a:off x="0" y="0"/>
+          <a:ext cx="0" cy="0"/>
+          <a:chOff x="0" y="0"/>
+          <a:chExt cx="0" cy="0"/>
+        </a:xfrm>
+      </p:grpSpPr>
+      <p:graphicFrame>
+        <p:nvGraphicFramePr>
+          <p:cNvPr id="2" name="Table 1"/>
+          <p:cNvGraphicFramePr>
+            <a:graphicFrameLocks noGrp="1"/>
+          </p:cNvGraphicFramePr>
+          <p:nvPr>
+            <p:extLst>
+              <p:ext uri="{D42A27DB-BD31-4B8C-83A1-F6EECF244321}">
+                <p14:modId xmlns:p14="http://schemas.microsoft.com/office/powerpoint/2010/main" val="849167663"/>
+              </p:ext>
+            </p:extLst>
+          </p:nvPr>
+        </p:nvGraphicFramePr>
+        <p:xfrm>
+          <a:off x="1799958" y="1099784"/>
+          <a:ext cx="7859430" cy="1842922"/>
+        </p:xfrm>
+        <a:graphic>
+          <a:graphicData uri="http://schemas.openxmlformats.org/drawingml/2006/table">
+            <a:tbl>
+              <a:tblPr firstRow="1" bandRow="1">
+                <a:tableStyleId>{5C22544A-7EE6-4342-B048-85BDC9FD1C3A}</a:tableStyleId>
+              </a:tblPr>
+              <a:tblGrid>
+                <a:gridCol w="1309905"/>
+                <a:gridCol w="1309905"/>
+                <a:gridCol w="1309905"/>
+                <a:gridCol w="1309905"/>
+                <a:gridCol w="1309905"/>
+                <a:gridCol w="1309905"/>
+              </a:tblGrid>
+              <a:tr h="1017564">
+                <a:tc>
+                  <a:txBody>
+                    <a:bodyPr/>
+                    <a:lstStyle/>
+                    <a:p>
+                      <a:r>
+                        <a:rPr lang="en-GB" sz="1800" dirty="0" smtClean="0"/>
+                        <a:t>Fraction</a:t>
+                      </a:r>
+                      <a:endParaRPr lang="en-GB" sz="1800" dirty="0"/>
+                    </a:p>
+                  </a:txBody>
+                  <a:tcPr/>
+                </a:tc>
+                <a:tc>
+                  <a:txBody>
+                    <a:bodyPr/>
+                    <a:lstStyle/>
+                    <a:p>
+                      <a:r>
+                        <a:rPr lang="en-GB" sz="1800" dirty="0" smtClean="0"/>
+                        <a:t>Number</a:t>
+                      </a:r>
+                      <a:r>
+                        <a:rPr lang="en-GB" sz="1800" baseline="0" dirty="0" smtClean="0"/>
+                        <a:t> of Cells</a:t>
+                      </a:r>
+                      <a:endParaRPr lang="en-GB" sz="1800" dirty="0"/>
+                    </a:p>
+                  </a:txBody>
+                  <a:tcPr/>
+                </a:tc>
+                <a:tc>
+                  <a:txBody>
+                    <a:bodyPr/>
+                    <a:lstStyle/>
+                    <a:p>
+                      <a:r>
+                        <a:rPr lang="en-GB" sz="1800" dirty="0" smtClean="0"/>
+                        <a:t>% B220+</a:t>
+                      </a:r>
+                      <a:endParaRPr lang="en-GB" sz="1800" dirty="0"/>
+                    </a:p>
+                  </a:txBody>
+                  <a:tcPr/>
+                </a:tc>
+                <a:tc>
+                  <a:txBody>
+                    <a:bodyPr/>
+                    <a:lstStyle/>
+                    <a:p>
+                      <a:r>
+                        <a:rPr lang="en-GB" sz="1800" dirty="0" smtClean="0"/>
+                        <a:t>% B220+ IgM+</a:t>
+                      </a:r>
+                      <a:endParaRPr lang="en-GB" sz="1800" dirty="0"/>
+                    </a:p>
+                  </a:txBody>
+                  <a:tcPr/>
+                </a:tc>
+                <a:tc>
+                  <a:txBody>
+                    <a:bodyPr/>
+                    <a:lstStyle/>
+                    <a:p>
+                      <a:r>
+                        <a:rPr lang="en-GB" sz="1800" dirty="0" smtClean="0"/>
+                        <a:t>Number</a:t>
+                      </a:r>
+                      <a:r>
+                        <a:rPr lang="en-GB" sz="1800" baseline="0" dirty="0" smtClean="0"/>
+                        <a:t> B220+</a:t>
+                      </a:r>
+                      <a:endParaRPr lang="en-GB" sz="1800" dirty="0"/>
+                    </a:p>
+                  </a:txBody>
+                  <a:tcPr/>
+                </a:tc>
+                <a:tc>
+                  <a:txBody>
+                    <a:bodyPr/>
+                    <a:lstStyle/>
+                    <a:p>
+                      <a:r>
+                        <a:rPr lang="en-GB" sz="1800" dirty="0" smtClean="0"/>
+                        <a:t>Number B220+IgM+</a:t>
+                      </a:r>
+                      <a:endParaRPr lang="en-GB" sz="1800" dirty="0"/>
+                    </a:p>
+                  </a:txBody>
+                  <a:tcPr/>
+                </a:tc>
+              </a:tr>
+              <a:tr h="412679">
+                <a:tc>
+                  <a:txBody>
+                    <a:bodyPr/>
+                    <a:lstStyle/>
+                    <a:p>
+                      <a:r>
+                        <a:rPr lang="en-GB" sz="1800" dirty="0" smtClean="0"/>
+                        <a:t>CD19+</a:t>
+                      </a:r>
+                      <a:endParaRPr lang="en-GB" sz="1800" dirty="0"/>
+                    </a:p>
+                  </a:txBody>
+                  <a:tcPr/>
+                </a:tc>
+                <a:tc>
+                  <a:txBody>
+                    <a:bodyPr/>
+                    <a:lstStyle/>
+                    <a:p>
+                      <a:r>
+                        <a:rPr lang="en-GB" sz="1800" dirty="0" smtClean="0"/>
+                        <a:t>1.3 x 10</a:t>
+                      </a:r>
+                      <a:r>
+                        <a:rPr lang="en-GB" sz="1800" baseline="30000" dirty="0" smtClean="0"/>
+                        <a:t>5</a:t>
+                      </a:r>
+                      <a:endParaRPr lang="en-GB" sz="1800" dirty="0"/>
+                    </a:p>
+                  </a:txBody>
+                  <a:tcPr/>
+                </a:tc>
+                <a:tc>
+                  <a:txBody>
+                    <a:bodyPr/>
+                    <a:lstStyle/>
+                    <a:p>
+                      <a:r>
+                        <a:rPr lang="en-GB" sz="1800" dirty="0" smtClean="0"/>
+                        <a:t>2.86</a:t>
+                      </a:r>
+                      <a:endParaRPr lang="en-GB" sz="1800" dirty="0"/>
+                    </a:p>
+                  </a:txBody>
+                  <a:tcPr/>
+                </a:tc>
+                <a:tc>
+                  <a:txBody>
+                    <a:bodyPr/>
+                    <a:lstStyle/>
+                    <a:p>
+                      <a:r>
+                        <a:rPr lang="en-GB" sz="1800" dirty="0" smtClean="0"/>
+                        <a:t>2.37</a:t>
+                      </a:r>
+                      <a:endParaRPr lang="en-GB" sz="1800" dirty="0"/>
+                    </a:p>
+                  </a:txBody>
+                  <a:tcPr/>
+                </a:tc>
+                <a:tc>
+                  <a:txBody>
+                    <a:bodyPr/>
+                    <a:lstStyle/>
+                    <a:p>
+                      <a:r>
+                        <a:rPr lang="en-GB" sz="1800" dirty="0" smtClean="0"/>
+                        <a:t>2743</a:t>
+                      </a:r>
+                      <a:endParaRPr lang="en-GB" sz="1800" dirty="0"/>
+                    </a:p>
+                  </a:txBody>
+                  <a:tcPr/>
+                </a:tc>
+                <a:tc>
+                  <a:txBody>
+                    <a:bodyPr/>
+                    <a:lstStyle/>
+                    <a:p>
+                      <a:r>
+                        <a:rPr lang="en-GB" sz="1800" dirty="0" smtClean="0"/>
+                        <a:t>2273</a:t>
+                      </a:r>
+                      <a:endParaRPr lang="en-GB" sz="1800" dirty="0"/>
+                    </a:p>
+                  </a:txBody>
+                  <a:tcPr/>
+                </a:tc>
+              </a:tr>
+              <a:tr h="412679">
+                <a:tc>
+                  <a:txBody>
+                    <a:bodyPr/>
+                    <a:lstStyle/>
+                    <a:p>
+                      <a:r>
+                        <a:rPr lang="en-GB" sz="1800" dirty="0" smtClean="0"/>
+                        <a:t>CD19-</a:t>
+                      </a:r>
+                      <a:endParaRPr lang="en-GB" sz="1800" dirty="0"/>
+                    </a:p>
+                  </a:txBody>
+                  <a:tcPr/>
+                </a:tc>
+                <a:tc>
+                  <a:txBody>
+                    <a:bodyPr/>
+                    <a:lstStyle/>
+                    <a:p>
+                      <a:r>
+                        <a:rPr lang="en-GB" sz="1800" dirty="0" smtClean="0"/>
+                        <a:t>3.67 x 10</a:t>
+                      </a:r>
+                      <a:r>
+                        <a:rPr lang="en-GB" sz="1800" baseline="30000" dirty="0" smtClean="0"/>
+                        <a:t>7</a:t>
+                      </a:r>
+                      <a:endParaRPr lang="en-GB" sz="1800" dirty="0"/>
+                    </a:p>
+                  </a:txBody>
+                  <a:tcPr/>
+                </a:tc>
+                <a:tc>
+                  <a:txBody>
+                    <a:bodyPr/>
+                    <a:lstStyle/>
+                    <a:p>
+                      <a:r>
+                        <a:rPr lang="en-GB" sz="1800" dirty="0" smtClean="0"/>
+                        <a:t>0.151</a:t>
+                      </a:r>
+                      <a:endParaRPr lang="en-GB" sz="1800" dirty="0"/>
+                    </a:p>
+                  </a:txBody>
+                  <a:tcPr/>
+                </a:tc>
+                <a:tc>
+                  <a:txBody>
+                    <a:bodyPr/>
+                    <a:lstStyle/>
+                    <a:p>
+                      <a:r>
+                        <a:rPr lang="en-GB" sz="1800" dirty="0" smtClean="0"/>
+                        <a:t>0.005</a:t>
+                      </a:r>
+                      <a:endParaRPr lang="en-GB" sz="1800" dirty="0"/>
+                    </a:p>
+                  </a:txBody>
+                  <a:tcPr/>
+                </a:tc>
+                <a:tc>
+                  <a:txBody>
+                    <a:bodyPr/>
+                    <a:lstStyle/>
+                    <a:p>
+                      <a:r>
+                        <a:rPr lang="en-GB" sz="1800" dirty="0" smtClean="0"/>
+                        <a:t>42920</a:t>
+                      </a:r>
+                      <a:endParaRPr lang="en-GB" sz="1800" dirty="0"/>
+                    </a:p>
+                  </a:txBody>
+                  <a:tcPr/>
+                </a:tc>
+                <a:tc>
+                  <a:txBody>
+                    <a:bodyPr/>
+                    <a:lstStyle/>
+                    <a:p>
+                      <a:r>
+                        <a:rPr lang="en-GB" sz="1800" dirty="0" smtClean="0"/>
+                        <a:t>1421</a:t>
+                      </a:r>
+                      <a:endParaRPr lang="en-GB" sz="1800" dirty="0"/>
+                    </a:p>
+                  </a:txBody>
+                  <a:tcPr/>
+                </a:tc>
+              </a:tr>
+            </a:tbl>
+          </a:graphicData>
+        </a:graphic>
+      </p:graphicFrame>
+    </p:spTree>
+    <p:extLst>
+      <p:ext uri="{BB962C8B-B14F-4D97-AF65-F5344CB8AC3E}">
+        <p14:creationId xmlns:p14="http://schemas.microsoft.com/office/powerpoint/2010/main" val="68358455"/>
+      </p:ext>
+    </p:extLst>
+  </p:cSld>
+  <p:clrMapOvr>
+    <a:masterClrMapping/>
+  </p:clrMapOvr>
+</p:sld>
+</file>
+
+<file path=ppt/slides/slide18.xml><?xml version="1.0" encoding="utf-8"?>
+<p:sld xmlns:a="http://schemas.openxmlformats.org/drawingml/2006/main" xmlns:r="http://schemas.openxmlformats.org/officeDocument/2006/relationships" xmlns:p="http://schemas.openxmlformats.org/presentationml/2006/main">
+  <p:cSld>
+    <p:spTree>
+      <p:nvGrpSpPr>
+        <p:cNvPr id="1" name=""/>
+        <p:cNvGrpSpPr/>
+        <p:nvPr/>
+      </p:nvGrpSpPr>
+      <p:grpSpPr>
+        <a:xfrm>
+          <a:off x="0" y="0"/>
+          <a:ext cx="0" cy="0"/>
+          <a:chOff x="0" y="0"/>
+          <a:chExt cx="0" cy="0"/>
+        </a:xfrm>
+      </p:grpSpPr>
+    </p:spTree>
+    <p:extLst>
+      <p:ext uri="{BB962C8B-B14F-4D97-AF65-F5344CB8AC3E}">
+        <p14:creationId xmlns:p14="http://schemas.microsoft.com/office/powerpoint/2010/main" val="4264736029"/>
       </p:ext>
     </p:extLst>
   </p:cSld>
@@ -8470,7 +9623,6 @@
               <a:rPr lang="en-GB" sz="1700" dirty="0" smtClean="0"/>
               <a:t>RAG+</a:t>
             </a:r>
-            <a:endParaRPr lang="en-GB" sz="1700" dirty="0" smtClean="0"/>
           </a:p>
           <a:p>
             <a:pPr algn="ctr"/>
@@ -8516,11 +9668,7 @@
             <a:pPr algn="ctr"/>
             <a:r>
               <a:rPr lang="en-GB" dirty="0" smtClean="0"/>
-              <a:t>5.06</a:t>
-            </a:r>
-            <a:r>
-              <a:rPr lang="en-GB" dirty="0" smtClean="0"/>
-              <a:t>%</a:t>
+              <a:t>5.06%</a:t>
             </a:r>
             <a:endParaRPr lang="en-GB" dirty="0"/>
           </a:p>
@@ -9307,6 +10455,46 @@
           </a:fontRef>
         </p:style>
       </p:cxnSp>
+      <p:sp>
+        <p:nvSpPr>
+          <p:cNvPr id="14" name="TextBox 13"/>
+          <p:cNvSpPr txBox="1"/>
+          <p:nvPr/>
+        </p:nvSpPr>
+        <p:spPr>
+          <a:xfrm>
+            <a:off x="4535081" y="1565568"/>
+            <a:ext cx="758541" cy="646331"/>
+          </a:xfrm>
+          <a:prstGeom prst="rect">
+            <a:avLst/>
+          </a:prstGeom>
+          <a:solidFill>
+            <a:schemeClr val="bg1"/>
+          </a:solidFill>
+        </p:spPr>
+        <p:txBody>
+          <a:bodyPr wrap="none" rtlCol="0">
+            <a:spAutoFit/>
+          </a:bodyPr>
+          <a:lstStyle/>
+          <a:p>
+            <a:pPr algn="ctr"/>
+            <a:r>
+              <a:rPr lang="en-GB" dirty="0" smtClean="0"/>
+              <a:t>+</a:t>
+            </a:r>
+          </a:p>
+          <a:p>
+            <a:pPr algn="ctr"/>
+            <a:r>
+              <a:rPr lang="en-GB" dirty="0" smtClean="0"/>
+              <a:t>80.5%</a:t>
+            </a:r>
+            <a:endParaRPr lang="en-GB" dirty="0"/>
+          </a:p>
+        </p:txBody>
+      </p:sp>
     </p:spTree>
     <p:extLst>
       <p:ext uri="{BB962C8B-B14F-4D97-AF65-F5344CB8AC3E}">

</xml_diff>